<commit_message>
alteração conforme combinado na aula
retirada a opção de escolha entre escola ou professor.
</commit_message>
<xml_diff>
--- a/prototipoexploratorio.pptx
+++ b/prototipoexploratorio.pptx
@@ -6,16 +6,15 @@
   </p:sldMasterIdLst>
   <p:sldIdLst>
     <p:sldId id="264" r:id="rId2"/>
-    <p:sldId id="265" r:id="rId3"/>
-    <p:sldId id="266" r:id="rId4"/>
-    <p:sldId id="267" r:id="rId5"/>
-    <p:sldId id="269" r:id="rId6"/>
-    <p:sldId id="271" r:id="rId7"/>
-    <p:sldId id="272" r:id="rId8"/>
-    <p:sldId id="273" r:id="rId9"/>
-    <p:sldId id="274" r:id="rId10"/>
-    <p:sldId id="275" r:id="rId11"/>
-    <p:sldId id="276" r:id="rId12"/>
+    <p:sldId id="266" r:id="rId3"/>
+    <p:sldId id="267" r:id="rId4"/>
+    <p:sldId id="269" r:id="rId5"/>
+    <p:sldId id="271" r:id="rId6"/>
+    <p:sldId id="272" r:id="rId7"/>
+    <p:sldId id="273" r:id="rId8"/>
+    <p:sldId id="274" r:id="rId9"/>
+    <p:sldId id="275" r:id="rId10"/>
+    <p:sldId id="276" r:id="rId11"/>
   </p:sldIdLst>
   <p:sldSz cx="12192000" cy="6858000"/>
   <p:notesSz cx="6858000" cy="9144000"/>
@@ -264,7 +263,7 @@
           <a:p>
             <a:fld id="{8A106747-A151-4651-9568-54DB89D494C1}" type="datetimeFigureOut">
               <a:rPr lang="pt-PT" smtClean="0"/>
-              <a:t>03/04/2014</a:t>
+              <a:t>06/04/2014</a:t>
             </a:fld>
             <a:endParaRPr lang="pt-PT"/>
           </a:p>
@@ -434,7 +433,7 @@
           <a:p>
             <a:fld id="{8A106747-A151-4651-9568-54DB89D494C1}" type="datetimeFigureOut">
               <a:rPr lang="pt-PT" smtClean="0"/>
-              <a:t>03/04/2014</a:t>
+              <a:t>06/04/2014</a:t>
             </a:fld>
             <a:endParaRPr lang="pt-PT"/>
           </a:p>
@@ -614,7 +613,7 @@
           <a:p>
             <a:fld id="{8A106747-A151-4651-9568-54DB89D494C1}" type="datetimeFigureOut">
               <a:rPr lang="pt-PT" smtClean="0"/>
-              <a:t>03/04/2014</a:t>
+              <a:t>06/04/2014</a:t>
             </a:fld>
             <a:endParaRPr lang="pt-PT"/>
           </a:p>
@@ -784,7 +783,7 @@
           <a:p>
             <a:fld id="{8A106747-A151-4651-9568-54DB89D494C1}" type="datetimeFigureOut">
               <a:rPr lang="pt-PT" smtClean="0"/>
-              <a:t>03/04/2014</a:t>
+              <a:t>06/04/2014</a:t>
             </a:fld>
             <a:endParaRPr lang="pt-PT"/>
           </a:p>
@@ -1030,7 +1029,7 @@
           <a:p>
             <a:fld id="{8A106747-A151-4651-9568-54DB89D494C1}" type="datetimeFigureOut">
               <a:rPr lang="pt-PT" smtClean="0"/>
-              <a:t>03/04/2014</a:t>
+              <a:t>06/04/2014</a:t>
             </a:fld>
             <a:endParaRPr lang="pt-PT"/>
           </a:p>
@@ -1262,7 +1261,7 @@
           <a:p>
             <a:fld id="{8A106747-A151-4651-9568-54DB89D494C1}" type="datetimeFigureOut">
               <a:rPr lang="pt-PT" smtClean="0"/>
-              <a:t>03/04/2014</a:t>
+              <a:t>06/04/2014</a:t>
             </a:fld>
             <a:endParaRPr lang="pt-PT"/>
           </a:p>
@@ -1629,7 +1628,7 @@
           <a:p>
             <a:fld id="{8A106747-A151-4651-9568-54DB89D494C1}" type="datetimeFigureOut">
               <a:rPr lang="pt-PT" smtClean="0"/>
-              <a:t>03/04/2014</a:t>
+              <a:t>06/04/2014</a:t>
             </a:fld>
             <a:endParaRPr lang="pt-PT"/>
           </a:p>
@@ -1747,7 +1746,7 @@
           <a:p>
             <a:fld id="{8A106747-A151-4651-9568-54DB89D494C1}" type="datetimeFigureOut">
               <a:rPr lang="pt-PT" smtClean="0"/>
-              <a:t>03/04/2014</a:t>
+              <a:t>06/04/2014</a:t>
             </a:fld>
             <a:endParaRPr lang="pt-PT"/>
           </a:p>
@@ -1842,7 +1841,7 @@
           <a:p>
             <a:fld id="{8A106747-A151-4651-9568-54DB89D494C1}" type="datetimeFigureOut">
               <a:rPr lang="pt-PT" smtClean="0"/>
-              <a:t>03/04/2014</a:t>
+              <a:t>06/04/2014</a:t>
             </a:fld>
             <a:endParaRPr lang="pt-PT"/>
           </a:p>
@@ -2119,7 +2118,7 @@
           <a:p>
             <a:fld id="{8A106747-A151-4651-9568-54DB89D494C1}" type="datetimeFigureOut">
               <a:rPr lang="pt-PT" smtClean="0"/>
-              <a:t>03/04/2014</a:t>
+              <a:t>06/04/2014</a:t>
             </a:fld>
             <a:endParaRPr lang="pt-PT"/>
           </a:p>
@@ -2372,7 +2371,7 @@
           <a:p>
             <a:fld id="{8A106747-A151-4651-9568-54DB89D494C1}" type="datetimeFigureOut">
               <a:rPr lang="pt-PT" smtClean="0"/>
-              <a:t>03/04/2014</a:t>
+              <a:t>06/04/2014</a:t>
             </a:fld>
             <a:endParaRPr lang="pt-PT"/>
           </a:p>
@@ -2585,7 +2584,7 @@
           <a:p>
             <a:fld id="{8A106747-A151-4651-9568-54DB89D494C1}" type="datetimeFigureOut">
               <a:rPr lang="pt-PT" smtClean="0"/>
-              <a:t>03/04/2014</a:t>
+              <a:t>06/04/2014</a:t>
             </a:fld>
             <a:endParaRPr lang="pt-PT"/>
           </a:p>
@@ -4017,986 +4016,6 @@
                   </a:glow>
                 </a:effectLst>
               </a:rPr>
-              <a:t>	Onde está a felicidade? Ninguém sabe onde ela para ou onde se pode encontrar. Há quem diga que não está em nenhum lugar e que simplesmente acontece. E, no entanto, em algum sítio há de estar. Não lhes parece?</a:t>
-            </a:r>
-          </a:p>
-          <a:p>
-            <a:endParaRPr lang="pt-PT" b="1" spc="50" dirty="0">
-              <a:ln w="9525" cmpd="sng">
-                <a:solidFill>
-                  <a:schemeClr val="accent1"/>
-                </a:solidFill>
-                <a:prstDash val="solid"/>
-              </a:ln>
-              <a:solidFill>
-                <a:srgbClr val="70AD47">
-                  <a:tint val="1000"/>
-                </a:srgbClr>
-              </a:solidFill>
-              <a:effectLst>
-                <a:glow rad="38100">
-                  <a:schemeClr val="accent1">
-                    <a:alpha val="40000"/>
-                  </a:schemeClr>
-                </a:glow>
-              </a:effectLst>
-            </a:endParaRPr>
-          </a:p>
-          <a:p>
-            <a:r>
-              <a:rPr lang="pt-PT" b="1" spc="50" dirty="0" smtClean="0">
-                <a:ln w="9525" cmpd="sng">
-                  <a:solidFill>
-                    <a:schemeClr val="accent1"/>
-                  </a:solidFill>
-                  <a:prstDash val="solid"/>
-                </a:ln>
-                <a:solidFill>
-                  <a:srgbClr val="70AD47">
-                    <a:tint val="1000"/>
-                  </a:srgbClr>
-                </a:solidFill>
-                <a:effectLst>
-                  <a:glow rad="38100">
-                    <a:schemeClr val="accent1">
-                      <a:alpha val="40000"/>
-                    </a:schemeClr>
-                  </a:glow>
-                </a:effectLst>
-              </a:rPr>
-              <a:t>	Às vezes está tão perto, tão à vista, que nos passa despercebida e outras tão distante, tão escondida nesse tal lugar, que uma vida não chega para lá chegar.</a:t>
-            </a:r>
-          </a:p>
-          <a:p>
-            <a:endParaRPr lang="pt-PT" b="1" spc="50" dirty="0">
-              <a:ln w="9525" cmpd="sng">
-                <a:solidFill>
-                  <a:schemeClr val="accent1"/>
-                </a:solidFill>
-                <a:prstDash val="solid"/>
-              </a:ln>
-              <a:solidFill>
-                <a:srgbClr val="70AD47">
-                  <a:tint val="1000"/>
-                </a:srgbClr>
-              </a:solidFill>
-              <a:effectLst>
-                <a:glow rad="38100">
-                  <a:schemeClr val="accent1">
-                    <a:alpha val="40000"/>
-                  </a:schemeClr>
-                </a:glow>
-              </a:effectLst>
-            </a:endParaRPr>
-          </a:p>
-          <a:p>
-            <a:r>
-              <a:rPr lang="pt-PT" b="1" spc="50" dirty="0" smtClean="0">
-                <a:ln w="9525" cmpd="sng">
-                  <a:solidFill>
-                    <a:schemeClr val="accent1"/>
-                  </a:solidFill>
-                  <a:prstDash val="solid"/>
-                </a:ln>
-                <a:solidFill>
-                  <a:srgbClr val="70AD47">
-                    <a:tint val="1000"/>
-                  </a:srgbClr>
-                </a:solidFill>
-                <a:effectLst>
-                  <a:glow rad="38100">
-                    <a:schemeClr val="accent1">
-                      <a:alpha val="40000"/>
-                    </a:schemeClr>
-                  </a:glow>
-                </a:effectLst>
-              </a:rPr>
-              <a:t>	Há os que pensam que só a encontramos se não a procurarmos. Nem pensarmos nisso. E os que estão convencidos de que é preciso procura-la sem cessar. Por isso  </a:t>
-            </a:r>
-            <a:endParaRPr lang="pt-PT" i="1" u="sng" cap="none" spc="50" dirty="0">
-              <a:ln w="9525" cmpd="sng">
-                <a:solidFill>
-                  <a:schemeClr val="accent1"/>
-                </a:solidFill>
-                <a:prstDash val="solid"/>
-              </a:ln>
-              <a:solidFill>
-                <a:srgbClr val="70AD47">
-                  <a:tint val="1000"/>
-                </a:srgbClr>
-              </a:solidFill>
-              <a:effectLst>
-                <a:glow rad="38100">
-                  <a:schemeClr val="accent1">
-                    <a:alpha val="40000"/>
-                  </a:schemeClr>
-                </a:glow>
-              </a:effectLst>
-            </a:endParaRPr>
-          </a:p>
-        </p:txBody>
-      </p:sp>
-      <p:pic>
-        <p:nvPicPr>
-          <p:cNvPr id="42" name="Imagem 41"/>
-          <p:cNvPicPr>
-            <a:picLocks noChangeAspect="1"/>
-          </p:cNvPicPr>
-          <p:nvPr/>
-        </p:nvPicPr>
-        <p:blipFill>
-          <a:blip r:embed="rId7" cstate="print">
-            <a:extLst>
-              <a:ext uri="{28A0092B-C50C-407E-A947-70E740481C1C}">
-                <a14:useLocalDpi xmlns:a14="http://schemas.microsoft.com/office/drawing/2010/main" val="0"/>
-              </a:ext>
-            </a:extLst>
-          </a:blip>
-          <a:stretch>
-            <a:fillRect/>
-          </a:stretch>
-        </p:blipFill>
-        <p:spPr>
-          <a:xfrm rot="10800000">
-            <a:off x="8706524" y="3242891"/>
-            <a:ext cx="914676" cy="914676"/>
-          </a:xfrm>
-          <a:prstGeom prst="rect">
-            <a:avLst/>
-          </a:prstGeom>
-        </p:spPr>
-      </p:pic>
-      <p:pic>
-        <p:nvPicPr>
-          <p:cNvPr id="5" name="Imagem 4"/>
-          <p:cNvPicPr>
-            <a:picLocks noChangeAspect="1"/>
-          </p:cNvPicPr>
-          <p:nvPr/>
-        </p:nvPicPr>
-        <p:blipFill>
-          <a:blip r:embed="rId8"/>
-          <a:stretch>
-            <a:fillRect/>
-          </a:stretch>
-        </p:blipFill>
-        <p:spPr>
-          <a:xfrm>
-            <a:off x="8681548" y="1057001"/>
-            <a:ext cx="981075" cy="476250"/>
-          </a:xfrm>
-          <a:prstGeom prst="rect">
-            <a:avLst/>
-          </a:prstGeom>
-        </p:spPr>
-      </p:pic>
-      <p:pic>
-        <p:nvPicPr>
-          <p:cNvPr id="6" name="Imagem 5"/>
-          <p:cNvPicPr>
-            <a:picLocks noChangeAspect="1"/>
-          </p:cNvPicPr>
-          <p:nvPr/>
-        </p:nvPicPr>
-        <p:blipFill>
-          <a:blip r:embed="rId9" cstate="print">
-            <a:extLst>
-              <a:ext uri="{28A0092B-C50C-407E-A947-70E740481C1C}">
-                <a14:useLocalDpi xmlns:a14="http://schemas.microsoft.com/office/drawing/2010/main" val="0"/>
-              </a:ext>
-            </a:extLst>
-          </a:blip>
-          <a:stretch>
-            <a:fillRect/>
-          </a:stretch>
-        </p:blipFill>
-        <p:spPr>
-          <a:xfrm>
-            <a:off x="8753210" y="2456370"/>
-            <a:ext cx="788452" cy="788452"/>
-          </a:xfrm>
-          <a:prstGeom prst="rect">
-            <a:avLst/>
-          </a:prstGeom>
-        </p:spPr>
-      </p:pic>
-      <p:pic>
-        <p:nvPicPr>
-          <p:cNvPr id="1026" name="Picture 2" descr="http://www.iconki.com/icons/Web-development/128x128-webicons/rec.png"/>
-          <p:cNvPicPr>
-            <a:picLocks noChangeAspect="1" noChangeArrowheads="1"/>
-          </p:cNvPicPr>
-          <p:nvPr/>
-        </p:nvPicPr>
-        <p:blipFill>
-          <a:blip r:embed="rId10">
-            <a:extLst>
-              <a:ext uri="{28A0092B-C50C-407E-A947-70E740481C1C}">
-                <a14:useLocalDpi xmlns:a14="http://schemas.microsoft.com/office/drawing/2010/main" val="0"/>
-              </a:ext>
-            </a:extLst>
-          </a:blip>
-          <a:srcRect/>
-          <a:stretch>
-            <a:fillRect/>
-          </a:stretch>
-        </p:blipFill>
-        <p:spPr bwMode="auto">
-          <a:xfrm>
-            <a:off x="8720128" y="1606516"/>
-            <a:ext cx="819182" cy="819183"/>
-          </a:xfrm>
-          <a:prstGeom prst="rect">
-            <a:avLst/>
-          </a:prstGeom>
-          <a:noFill/>
-          <a:extLst>
-            <a:ext uri="{909E8E84-426E-40DD-AFC4-6F175D3DCCD1}">
-              <a14:hiddenFill xmlns:a14="http://schemas.microsoft.com/office/drawing/2010/main">
-                <a:solidFill>
-                  <a:srgbClr val="FFFFFF"/>
-                </a:solidFill>
-              </a14:hiddenFill>
-            </a:ext>
-          </a:extLst>
-        </p:spPr>
-      </p:pic>
-      <p:pic>
-        <p:nvPicPr>
-          <p:cNvPr id="43" name="Imagem 42"/>
-          <p:cNvPicPr>
-            <a:picLocks noChangeAspect="1"/>
-          </p:cNvPicPr>
-          <p:nvPr/>
-        </p:nvPicPr>
-        <p:blipFill>
-          <a:blip r:embed="rId11" cstate="print">
-            <a:extLst>
-              <a:ext uri="{28A0092B-C50C-407E-A947-70E740481C1C}">
-                <a14:useLocalDpi xmlns:a14="http://schemas.microsoft.com/office/drawing/2010/main" val="0"/>
-              </a:ext>
-            </a:extLst>
-          </a:blip>
-          <a:stretch>
-            <a:fillRect/>
-          </a:stretch>
-        </p:blipFill>
-        <p:spPr>
-          <a:xfrm>
-            <a:off x="8591436" y="1661884"/>
-            <a:ext cx="1315896" cy="1315896"/>
-          </a:xfrm>
-          <a:prstGeom prst="rect">
-            <a:avLst/>
-          </a:prstGeom>
-        </p:spPr>
-      </p:pic>
-    </p:spTree>
-    <p:extLst>
-      <p:ext uri="{BB962C8B-B14F-4D97-AF65-F5344CB8AC3E}">
-        <p14:creationId xmlns:p14="http://schemas.microsoft.com/office/powerpoint/2010/main" val="18114216"/>
-      </p:ext>
-    </p:extLst>
-  </p:cSld>
-  <p:clrMapOvr>
-    <a:masterClrMapping/>
-  </p:clrMapOvr>
-  <p:timing>
-    <p:tnLst>
-      <p:par>
-        <p:cTn id="1" dur="indefinite" restart="never" nodeType="tmRoot">
-          <p:childTnLst>
-            <p:seq concurrent="1" nextAc="seek">
-              <p:cTn id="2" dur="indefinite" nodeType="mainSeq">
-                <p:childTnLst>
-                  <p:par>
-                    <p:cTn id="3" fill="hold">
-                      <p:stCondLst>
-                        <p:cond delay="indefinite"/>
-                      </p:stCondLst>
-                      <p:childTnLst>
-                        <p:par>
-                          <p:cTn id="4" fill="hold">
-                            <p:stCondLst>
-                              <p:cond delay="0"/>
-                            </p:stCondLst>
-                            <p:childTnLst>
-                              <p:par>
-                                <p:cTn id="5" presetID="1" presetClass="entr" presetSubtype="0" fill="hold" nodeType="clickEffect">
-                                  <p:stCondLst>
-                                    <p:cond delay="0"/>
-                                  </p:stCondLst>
-                                  <p:childTnLst>
-                                    <p:set>
-                                      <p:cBhvr>
-                                        <p:cTn id="6" dur="1" fill="hold">
-                                          <p:stCondLst>
-                                            <p:cond delay="0"/>
-                                          </p:stCondLst>
-                                        </p:cTn>
-                                        <p:tgtEl>
-                                          <p:spTgt spid="43"/>
-                                        </p:tgtEl>
-                                        <p:attrNameLst>
-                                          <p:attrName>style.visibility</p:attrName>
-                                        </p:attrNameLst>
-                                      </p:cBhvr>
-                                      <p:to>
-                                        <p:strVal val="visible"/>
-                                      </p:to>
-                                    </p:set>
-                                  </p:childTnLst>
-                                </p:cTn>
-                              </p:par>
-                            </p:childTnLst>
-                          </p:cTn>
-                        </p:par>
-                      </p:childTnLst>
-                    </p:cTn>
-                  </p:par>
-                </p:childTnLst>
-              </p:cTn>
-              <p:prevCondLst>
-                <p:cond evt="onPrev" delay="0">
-                  <p:tgtEl>
-                    <p:sldTgt/>
-                  </p:tgtEl>
-                </p:cond>
-              </p:prevCondLst>
-              <p:nextCondLst>
-                <p:cond evt="onNext" delay="0">
-                  <p:tgtEl>
-                    <p:sldTgt/>
-                  </p:tgtEl>
-                </p:cond>
-              </p:nextCondLst>
-            </p:seq>
-          </p:childTnLst>
-        </p:cTn>
-      </p:par>
-    </p:tnLst>
-  </p:timing>
-</p:sld>
-</file>
-
-<file path=ppt/slides/slide11.xml><?xml version="1.0" encoding="utf-8"?>
-<p:sld xmlns:a="http://schemas.openxmlformats.org/drawingml/2006/main" xmlns:r="http://schemas.openxmlformats.org/officeDocument/2006/relationships" xmlns:p="http://schemas.openxmlformats.org/presentationml/2006/main">
-  <p:cSld>
-    <p:spTree>
-      <p:nvGrpSpPr>
-        <p:cNvPr id="1" name=""/>
-        <p:cNvGrpSpPr/>
-        <p:nvPr/>
-      </p:nvGrpSpPr>
-      <p:grpSpPr>
-        <a:xfrm>
-          <a:off x="0" y="0"/>
-          <a:ext cx="0" cy="0"/>
-          <a:chOff x="0" y="0"/>
-          <a:chExt cx="0" cy="0"/>
-        </a:xfrm>
-      </p:grpSpPr>
-      <p:pic>
-        <p:nvPicPr>
-          <p:cNvPr id="2" name="Imagem 1"/>
-          <p:cNvPicPr>
-            <a:picLocks noChangeAspect="1"/>
-          </p:cNvPicPr>
-          <p:nvPr/>
-        </p:nvPicPr>
-        <p:blipFill>
-          <a:blip r:embed="rId2">
-            <a:extLst>
-              <a:ext uri="{28A0092B-C50C-407E-A947-70E740481C1C}">
-                <a14:useLocalDpi xmlns:a14="http://schemas.microsoft.com/office/drawing/2010/main" val="0"/>
-              </a:ext>
-            </a:extLst>
-          </a:blip>
-          <a:stretch>
-            <a:fillRect/>
-          </a:stretch>
-        </p:blipFill>
-        <p:spPr>
-          <a:xfrm>
-            <a:off x="965915" y="268759"/>
-            <a:ext cx="9697791" cy="6469285"/>
-          </a:xfrm>
-          <a:prstGeom prst="rect">
-            <a:avLst/>
-          </a:prstGeom>
-        </p:spPr>
-      </p:pic>
-      <p:sp>
-        <p:nvSpPr>
-          <p:cNvPr id="3" name="Retângulo 2"/>
-          <p:cNvSpPr/>
-          <p:nvPr/>
-        </p:nvSpPr>
-        <p:spPr>
-          <a:xfrm>
-            <a:off x="1910730" y="953036"/>
-            <a:ext cx="7856113" cy="4919729"/>
-          </a:xfrm>
-          <a:prstGeom prst="rect">
-            <a:avLst/>
-          </a:prstGeom>
-        </p:spPr>
-        <p:style>
-          <a:lnRef idx="2">
-            <a:schemeClr val="accent1">
-              <a:shade val="50000"/>
-            </a:schemeClr>
-          </a:lnRef>
-          <a:fillRef idx="1">
-            <a:schemeClr val="accent1"/>
-          </a:fillRef>
-          <a:effectRef idx="0">
-            <a:schemeClr val="accent1"/>
-          </a:effectRef>
-          <a:fontRef idx="minor">
-            <a:schemeClr val="lt1"/>
-          </a:fontRef>
-        </p:style>
-        <p:txBody>
-          <a:bodyPr rtlCol="0" anchor="ctr"/>
-          <a:lstStyle/>
-          <a:p>
-            <a:pPr algn="ctr"/>
-            <a:endParaRPr lang="pt-PT"/>
-          </a:p>
-        </p:txBody>
-      </p:sp>
-      <p:pic>
-        <p:nvPicPr>
-          <p:cNvPr id="8" name="Imagem 7"/>
-          <p:cNvPicPr>
-            <a:picLocks noChangeAspect="1"/>
-          </p:cNvPicPr>
-          <p:nvPr/>
-        </p:nvPicPr>
-        <p:blipFill>
-          <a:blip r:embed="rId3" cstate="print">
-            <a:extLst>
-              <a:ext uri="{28A0092B-C50C-407E-A947-70E740481C1C}">
-                <a14:useLocalDpi xmlns:a14="http://schemas.microsoft.com/office/drawing/2010/main" val="0"/>
-              </a:ext>
-            </a:extLst>
-          </a:blip>
-          <a:stretch>
-            <a:fillRect/>
-          </a:stretch>
-        </p:blipFill>
-        <p:spPr>
-          <a:xfrm>
-            <a:off x="2016782" y="1093005"/>
-            <a:ext cx="610226" cy="610226"/>
-          </a:xfrm>
-          <a:prstGeom prst="rect">
-            <a:avLst/>
-          </a:prstGeom>
-        </p:spPr>
-      </p:pic>
-      <p:sp>
-        <p:nvSpPr>
-          <p:cNvPr id="9" name="Retângulo 8"/>
-          <p:cNvSpPr/>
-          <p:nvPr/>
-        </p:nvSpPr>
-        <p:spPr>
-          <a:xfrm>
-            <a:off x="4827379" y="1876367"/>
-            <a:ext cx="184730" cy="923330"/>
-          </a:xfrm>
-          <a:prstGeom prst="rect">
-            <a:avLst/>
-          </a:prstGeom>
-          <a:noFill/>
-        </p:spPr>
-        <p:txBody>
-          <a:bodyPr wrap="none" lIns="91440" tIns="45720" rIns="91440" bIns="45720">
-            <a:spAutoFit/>
-          </a:bodyPr>
-          <a:lstStyle/>
-          <a:p>
-            <a:pPr algn="ctr"/>
-            <a:endParaRPr lang="pt-PT" sz="5400" b="1" spc="50" dirty="0" smtClean="0">
-              <a:ln w="9525" cmpd="sng">
-                <a:solidFill>
-                  <a:schemeClr val="accent1"/>
-                </a:solidFill>
-                <a:prstDash val="solid"/>
-              </a:ln>
-              <a:solidFill>
-                <a:srgbClr val="70AD47">
-                  <a:tint val="1000"/>
-                </a:srgbClr>
-              </a:solidFill>
-              <a:effectLst>
-                <a:glow rad="38100">
-                  <a:schemeClr val="accent1">
-                    <a:alpha val="40000"/>
-                  </a:schemeClr>
-                </a:glow>
-              </a:effectLst>
-            </a:endParaRPr>
-          </a:p>
-        </p:txBody>
-      </p:sp>
-      <p:sp>
-        <p:nvSpPr>
-          <p:cNvPr id="7" name="Retângulo 6"/>
-          <p:cNvSpPr/>
-          <p:nvPr/>
-        </p:nvSpPr>
-        <p:spPr>
-          <a:xfrm>
-            <a:off x="2698963" y="1241566"/>
-            <a:ext cx="4822299" cy="369332"/>
-          </a:xfrm>
-          <a:prstGeom prst="rect">
-            <a:avLst/>
-          </a:prstGeom>
-          <a:noFill/>
-        </p:spPr>
-        <p:txBody>
-          <a:bodyPr wrap="square" lIns="91440" tIns="45720" rIns="91440" bIns="45720">
-            <a:spAutoFit/>
-          </a:bodyPr>
-          <a:lstStyle/>
-          <a:p>
-            <a:pPr algn="ctr"/>
-            <a:r>
-              <a:rPr lang="pt-PT" b="1" cap="none" spc="50" dirty="0" smtClean="0">
-                <a:ln w="9525" cmpd="sng">
-                  <a:solidFill>
-                    <a:schemeClr val="accent1"/>
-                  </a:solidFill>
-                  <a:prstDash val="solid"/>
-                </a:ln>
-                <a:solidFill>
-                  <a:srgbClr val="70AD47">
-                    <a:tint val="1000"/>
-                  </a:srgbClr>
-                </a:solidFill>
-                <a:effectLst>
-                  <a:glow rad="38100">
-                    <a:schemeClr val="accent1">
-                      <a:alpha val="40000"/>
-                    </a:schemeClr>
-                  </a:glow>
-                </a:effectLst>
-              </a:rPr>
-              <a:t>Escola Básica e Secundária Artur Gonçalves</a:t>
-            </a:r>
-            <a:endParaRPr lang="pt-PT" b="1" cap="none" spc="50" dirty="0">
-              <a:ln w="9525" cmpd="sng">
-                <a:solidFill>
-                  <a:schemeClr val="accent1"/>
-                </a:solidFill>
-                <a:prstDash val="solid"/>
-              </a:ln>
-              <a:solidFill>
-                <a:srgbClr val="70AD47">
-                  <a:tint val="1000"/>
-                </a:srgbClr>
-              </a:solidFill>
-              <a:effectLst>
-                <a:glow rad="38100">
-                  <a:schemeClr val="accent1">
-                    <a:alpha val="40000"/>
-                  </a:schemeClr>
-                </a:glow>
-              </a:effectLst>
-            </a:endParaRPr>
-          </a:p>
-        </p:txBody>
-      </p:sp>
-      <p:pic>
-        <p:nvPicPr>
-          <p:cNvPr id="21" name="Imagem 20"/>
-          <p:cNvPicPr>
-            <a:picLocks noChangeAspect="1"/>
-          </p:cNvPicPr>
-          <p:nvPr/>
-        </p:nvPicPr>
-        <p:blipFill>
-          <a:blip r:embed="rId4" cstate="print">
-            <a:extLst>
-              <a:ext uri="{28A0092B-C50C-407E-A947-70E740481C1C}">
-                <a14:useLocalDpi xmlns:a14="http://schemas.microsoft.com/office/drawing/2010/main" val="0"/>
-              </a:ext>
-            </a:extLst>
-          </a:blip>
-          <a:stretch>
-            <a:fillRect/>
-          </a:stretch>
-        </p:blipFill>
-        <p:spPr>
-          <a:xfrm>
-            <a:off x="8791310" y="4992092"/>
-            <a:ext cx="733260" cy="733260"/>
-          </a:xfrm>
-          <a:prstGeom prst="rect">
-            <a:avLst/>
-          </a:prstGeom>
-        </p:spPr>
-      </p:pic>
-      <p:sp>
-        <p:nvSpPr>
-          <p:cNvPr id="28" name="Retângulo 27"/>
-          <p:cNvSpPr/>
-          <p:nvPr/>
-        </p:nvSpPr>
-        <p:spPr>
-          <a:xfrm>
-            <a:off x="1524337" y="1683526"/>
-            <a:ext cx="3586176" cy="369332"/>
-          </a:xfrm>
-          <a:prstGeom prst="rect">
-            <a:avLst/>
-          </a:prstGeom>
-          <a:noFill/>
-        </p:spPr>
-        <p:txBody>
-          <a:bodyPr wrap="square" lIns="91440" tIns="45720" rIns="91440" bIns="45720">
-            <a:spAutoFit/>
-          </a:bodyPr>
-          <a:lstStyle/>
-          <a:p>
-            <a:pPr algn="ctr"/>
-            <a:r>
-              <a:rPr lang="pt-PT" b="1" cap="none" spc="50" dirty="0" smtClean="0">
-                <a:ln w="9525" cmpd="sng">
-                  <a:solidFill>
-                    <a:schemeClr val="accent1"/>
-                  </a:solidFill>
-                  <a:prstDash val="solid"/>
-                </a:ln>
-                <a:solidFill>
-                  <a:srgbClr val="70AD47">
-                    <a:tint val="1000"/>
-                  </a:srgbClr>
-                </a:solidFill>
-                <a:effectLst>
-                  <a:glow rad="38100">
-                    <a:schemeClr val="accent1">
-                      <a:alpha val="40000"/>
-                    </a:schemeClr>
-                  </a:glow>
-                </a:effectLst>
-              </a:rPr>
-              <a:t> </a:t>
-            </a:r>
-            <a:r>
-              <a:rPr lang="pt-PT" cap="none" spc="50" dirty="0" smtClean="0">
-                <a:ln w="9525" cmpd="sng">
-                  <a:solidFill>
-                    <a:schemeClr val="accent1"/>
-                  </a:solidFill>
-                  <a:prstDash val="solid"/>
-                </a:ln>
-                <a:solidFill>
-                  <a:srgbClr val="70AD47">
-                    <a:tint val="1000"/>
-                  </a:srgbClr>
-                </a:solidFill>
-                <a:effectLst>
-                  <a:glow rad="38100">
-                    <a:schemeClr val="accent1">
-                      <a:alpha val="40000"/>
-                    </a:schemeClr>
-                  </a:glow>
-                </a:effectLst>
-              </a:rPr>
-              <a:t>Aluno: </a:t>
-            </a:r>
-            <a:r>
-              <a:rPr lang="pt-PT" i="1" u="sng" cap="none" spc="50" dirty="0" smtClean="0">
-                <a:ln w="9525" cmpd="sng">
-                  <a:solidFill>
-                    <a:schemeClr val="accent1"/>
-                  </a:solidFill>
-                  <a:prstDash val="solid"/>
-                </a:ln>
-                <a:solidFill>
-                  <a:srgbClr val="70AD47">
-                    <a:tint val="1000"/>
-                  </a:srgbClr>
-                </a:solidFill>
-                <a:effectLst>
-                  <a:glow rad="38100">
-                    <a:schemeClr val="accent1">
-                      <a:alpha val="40000"/>
-                    </a:schemeClr>
-                  </a:glow>
-                </a:effectLst>
-              </a:rPr>
-              <a:t>1. Alberto Marques</a:t>
-            </a:r>
-            <a:endParaRPr lang="pt-PT" i="1" u="sng" cap="none" spc="50" dirty="0">
-              <a:ln w="9525" cmpd="sng">
-                <a:solidFill>
-                  <a:schemeClr val="accent1"/>
-                </a:solidFill>
-                <a:prstDash val="solid"/>
-              </a:ln>
-              <a:solidFill>
-                <a:srgbClr val="70AD47">
-                  <a:tint val="1000"/>
-                </a:srgbClr>
-              </a:solidFill>
-              <a:effectLst>
-                <a:glow rad="38100">
-                  <a:schemeClr val="accent1">
-                    <a:alpha val="40000"/>
-                  </a:schemeClr>
-                </a:glow>
-              </a:effectLst>
-            </a:endParaRPr>
-          </a:p>
-        </p:txBody>
-      </p:sp>
-      <p:pic>
-        <p:nvPicPr>
-          <p:cNvPr id="19" name="Imagem 18"/>
-          <p:cNvPicPr>
-            <a:picLocks noChangeAspect="1"/>
-          </p:cNvPicPr>
-          <p:nvPr/>
-        </p:nvPicPr>
-        <p:blipFill>
-          <a:blip r:embed="rId5" cstate="print">
-            <a:extLst>
-              <a:ext uri="{28A0092B-C50C-407E-A947-70E740481C1C}">
-                <a14:useLocalDpi xmlns:a14="http://schemas.microsoft.com/office/drawing/2010/main" val="0"/>
-              </a:ext>
-            </a:extLst>
-          </a:blip>
-          <a:stretch>
-            <a:fillRect/>
-          </a:stretch>
-        </p:blipFill>
-        <p:spPr>
-          <a:xfrm>
-            <a:off x="8157623" y="1096219"/>
-            <a:ext cx="419705" cy="419705"/>
-          </a:xfrm>
-          <a:prstGeom prst="rect">
-            <a:avLst/>
-          </a:prstGeom>
-        </p:spPr>
-      </p:pic>
-      <p:sp>
-        <p:nvSpPr>
-          <p:cNvPr id="20" name="Retângulo 19"/>
-          <p:cNvSpPr/>
-          <p:nvPr/>
-        </p:nvSpPr>
-        <p:spPr>
-          <a:xfrm>
-            <a:off x="1952387" y="2000926"/>
-            <a:ext cx="3980098" cy="369332"/>
-          </a:xfrm>
-          <a:prstGeom prst="rect">
-            <a:avLst/>
-          </a:prstGeom>
-          <a:noFill/>
-        </p:spPr>
-        <p:txBody>
-          <a:bodyPr wrap="square" lIns="91440" tIns="45720" rIns="91440" bIns="45720">
-            <a:spAutoFit/>
-          </a:bodyPr>
-          <a:lstStyle/>
-          <a:p>
-            <a:pPr algn="ctr"/>
-            <a:r>
-              <a:rPr lang="pt-PT" b="1" cap="none" spc="50" dirty="0" smtClean="0">
-                <a:ln w="9525" cmpd="sng">
-                  <a:solidFill>
-                    <a:schemeClr val="accent1"/>
-                  </a:solidFill>
-                  <a:prstDash val="solid"/>
-                </a:ln>
-                <a:solidFill>
-                  <a:srgbClr val="70AD47">
-                    <a:tint val="1000"/>
-                  </a:srgbClr>
-                </a:solidFill>
-                <a:effectLst>
-                  <a:glow rad="38100">
-                    <a:schemeClr val="accent1">
-                      <a:alpha val="40000"/>
-                    </a:schemeClr>
-                  </a:glow>
-                </a:effectLst>
-              </a:rPr>
-              <a:t> </a:t>
-            </a:r>
-            <a:r>
-              <a:rPr lang="pt-PT" b="1" spc="50" dirty="0" smtClean="0">
-                <a:ln w="9525" cmpd="sng">
-                  <a:solidFill>
-                    <a:schemeClr val="accent1"/>
-                  </a:solidFill>
-                  <a:prstDash val="solid"/>
-                </a:ln>
-                <a:solidFill>
-                  <a:srgbClr val="70AD47">
-                    <a:tint val="1000"/>
-                  </a:srgbClr>
-                </a:solidFill>
-                <a:effectLst>
-                  <a:glow rad="38100">
-                    <a:schemeClr val="accent1">
-                      <a:alpha val="40000"/>
-                    </a:schemeClr>
-                  </a:glow>
-                </a:effectLst>
-              </a:rPr>
-              <a:t>Teste 1: Onde está a felicidade?</a:t>
-            </a:r>
-            <a:endParaRPr lang="pt-PT" i="1" u="sng" cap="none" spc="50" dirty="0">
-              <a:ln w="9525" cmpd="sng">
-                <a:solidFill>
-                  <a:schemeClr val="accent1"/>
-                </a:solidFill>
-                <a:prstDash val="solid"/>
-              </a:ln>
-              <a:solidFill>
-                <a:srgbClr val="70AD47">
-                  <a:tint val="1000"/>
-                </a:srgbClr>
-              </a:solidFill>
-              <a:effectLst>
-                <a:glow rad="38100">
-                  <a:schemeClr val="accent1">
-                    <a:alpha val="40000"/>
-                  </a:schemeClr>
-                </a:glow>
-              </a:effectLst>
-            </a:endParaRPr>
-          </a:p>
-        </p:txBody>
-      </p:sp>
-      <p:sp>
-        <p:nvSpPr>
-          <p:cNvPr id="23" name="Retângulo 22"/>
-          <p:cNvSpPr/>
-          <p:nvPr/>
-        </p:nvSpPr>
-        <p:spPr>
-          <a:xfrm>
-            <a:off x="2321895" y="2332375"/>
-            <a:ext cx="6259133" cy="3349060"/>
-          </a:xfrm>
-          <a:prstGeom prst="rect">
-            <a:avLst/>
-          </a:prstGeom>
-          <a:solidFill>
-            <a:schemeClr val="accent1">
-              <a:lumMod val="60000"/>
-              <a:lumOff val="40000"/>
-            </a:schemeClr>
-          </a:solidFill>
-        </p:spPr>
-        <p:style>
-          <a:lnRef idx="2">
-            <a:schemeClr val="accent1">
-              <a:shade val="50000"/>
-            </a:schemeClr>
-          </a:lnRef>
-          <a:fillRef idx="1">
-            <a:schemeClr val="accent1"/>
-          </a:fillRef>
-          <a:effectRef idx="0">
-            <a:schemeClr val="accent1"/>
-          </a:effectRef>
-          <a:fontRef idx="minor">
-            <a:schemeClr val="lt1"/>
-          </a:fontRef>
-        </p:style>
-        <p:txBody>
-          <a:bodyPr rtlCol="0" anchor="ctr"/>
-          <a:lstStyle/>
-          <a:p>
-            <a:pPr algn="ctr"/>
-            <a:endParaRPr lang="pt-PT"/>
-          </a:p>
-        </p:txBody>
-      </p:sp>
-      <p:pic>
-        <p:nvPicPr>
-          <p:cNvPr id="29" name="Imagem 28"/>
-          <p:cNvPicPr>
-            <a:picLocks noChangeAspect="1"/>
-          </p:cNvPicPr>
-          <p:nvPr/>
-        </p:nvPicPr>
-        <p:blipFill>
-          <a:blip r:embed="rId6" cstate="print">
-            <a:extLst>
-              <a:ext uri="{28A0092B-C50C-407E-A947-70E740481C1C}">
-                <a14:useLocalDpi xmlns:a14="http://schemas.microsoft.com/office/drawing/2010/main" val="0"/>
-              </a:ext>
-            </a:extLst>
-          </a:blip>
-          <a:stretch>
-            <a:fillRect/>
-          </a:stretch>
-        </p:blipFill>
-        <p:spPr>
-          <a:xfrm>
-            <a:off x="8704254" y="4062014"/>
-            <a:ext cx="930078" cy="930078"/>
-          </a:xfrm>
-          <a:prstGeom prst="rect">
-            <a:avLst/>
-          </a:prstGeom>
-        </p:spPr>
-      </p:pic>
-      <p:sp>
-        <p:nvSpPr>
-          <p:cNvPr id="41" name="Retângulo 40"/>
-          <p:cNvSpPr/>
-          <p:nvPr/>
-        </p:nvSpPr>
-        <p:spPr>
-          <a:xfrm>
-            <a:off x="2294500" y="2370258"/>
-            <a:ext cx="6437424" cy="3416320"/>
-          </a:xfrm>
-          <a:prstGeom prst="rect">
-            <a:avLst/>
-          </a:prstGeom>
-          <a:noFill/>
-        </p:spPr>
-        <p:txBody>
-          <a:bodyPr wrap="square" lIns="91440" tIns="45720" rIns="91440" bIns="45720">
-            <a:spAutoFit/>
-          </a:bodyPr>
-          <a:lstStyle/>
-          <a:p>
-            <a:r>
-              <a:rPr lang="pt-PT" b="1" spc="50" dirty="0" smtClean="0">
-                <a:ln w="9525" cmpd="sng">
-                  <a:solidFill>
-                    <a:schemeClr val="accent1"/>
-                  </a:solidFill>
-                  <a:prstDash val="solid"/>
-                </a:ln>
-                <a:solidFill>
-                  <a:srgbClr val="70AD47">
-                    <a:tint val="1000"/>
-                  </a:srgbClr>
-                </a:solidFill>
-                <a:effectLst>
-                  <a:glow rad="38100">
-                    <a:schemeClr val="accent1">
-                      <a:alpha val="40000"/>
-                    </a:schemeClr>
-                  </a:glow>
-                </a:effectLst>
-              </a:rPr>
               <a:t>	Onde está a felicidade? Ninguém sabe onde ela para ou onde se pode encontrar. Há quem diga que não está em nenhum lugar e que </a:t>
             </a:r>
             <a:r>
@@ -5423,7 +4442,7 @@
         </p:nvSpPr>
         <p:spPr>
           <a:xfrm>
-            <a:off x="1906073" y="953037"/>
+            <a:off x="1912511" y="946286"/>
             <a:ext cx="7856113" cy="4919729"/>
           </a:xfrm>
           <a:prstGeom prst="rect">
@@ -5455,55 +4474,6 @@
           </a:p>
         </p:txBody>
       </p:sp>
-      <p:sp>
-        <p:nvSpPr>
-          <p:cNvPr id="7" name="Retângulo 6"/>
-          <p:cNvSpPr/>
-          <p:nvPr/>
-        </p:nvSpPr>
-        <p:spPr>
-          <a:xfrm>
-            <a:off x="2627008" y="953037"/>
-            <a:ext cx="3365024" cy="923330"/>
-          </a:xfrm>
-          <a:prstGeom prst="rect">
-            <a:avLst/>
-          </a:prstGeom>
-          <a:noFill/>
-        </p:spPr>
-        <p:txBody>
-          <a:bodyPr wrap="none" lIns="91440" tIns="45720" rIns="91440" bIns="45720">
-            <a:spAutoFit/>
-          </a:bodyPr>
-          <a:lstStyle/>
-          <a:p>
-            <a:pPr algn="ctr"/>
-            <a:r>
-              <a:rPr lang="pt-PT" sz="5400" b="1" spc="50" dirty="0" smtClean="0">
-                <a:ln w="9525" cmpd="sng">
-                  <a:solidFill>
-                    <a:schemeClr val="accent1"/>
-                  </a:solidFill>
-                  <a:prstDash val="solid"/>
-                </a:ln>
-                <a:solidFill>
-                  <a:srgbClr val="70AD47">
-                    <a:tint val="1000"/>
-                  </a:srgbClr>
-                </a:solidFill>
-                <a:effectLst>
-                  <a:glow rad="38100">
-                    <a:schemeClr val="accent1">
-                      <a:alpha val="40000"/>
-                    </a:schemeClr>
-                  </a:glow>
-                </a:effectLst>
-              </a:rPr>
-              <a:t>Bem-vindo</a:t>
-            </a:r>
-          </a:p>
-        </p:txBody>
-      </p:sp>
       <p:pic>
         <p:nvPicPr>
           <p:cNvPr id="8" name="Imagem 7"/>
@@ -5582,14 +4552,14 @@
       </p:sp>
       <p:sp>
         <p:nvSpPr>
-          <p:cNvPr id="10" name="Retângulo 9"/>
+          <p:cNvPr id="12" name="Retângulo 11"/>
           <p:cNvSpPr/>
           <p:nvPr/>
         </p:nvSpPr>
         <p:spPr>
           <a:xfrm>
-            <a:off x="3102932" y="4474163"/>
-            <a:ext cx="1909177" cy="369332"/>
+            <a:off x="2038689" y="2469942"/>
+            <a:ext cx="2220781" cy="923330"/>
           </a:xfrm>
           <a:prstGeom prst="rect">
             <a:avLst/>
@@ -5597,7 +4567,7 @@
           <a:noFill/>
         </p:spPr>
         <p:txBody>
-          <a:bodyPr wrap="none" lIns="91440" tIns="45720" rIns="91440" bIns="45720">
+          <a:bodyPr wrap="square" lIns="91440" tIns="45720" rIns="91440" bIns="45720">
             <a:spAutoFit/>
           </a:bodyPr>
           <a:lstStyle/>
@@ -5624,7 +4594,7 @@
                   </a:glow>
                 </a:effectLst>
               </a:rPr>
-              <a:t>Entrar por escola</a:t>
+              <a:t>Escola Básica e Secundária Artur Gonçalves</a:t>
             </a:r>
             <a:endParaRPr lang="pt-PT" b="1" cap="none" spc="50" dirty="0">
               <a:ln w="9525" cmpd="sng">
@@ -5651,14 +4621,14 @@
       </p:sp>
       <p:sp>
         <p:nvSpPr>
-          <p:cNvPr id="11" name="Retângulo 10"/>
+          <p:cNvPr id="13" name="Retângulo 12"/>
           <p:cNvSpPr/>
           <p:nvPr/>
         </p:nvSpPr>
         <p:spPr>
           <a:xfrm>
-            <a:off x="6468144" y="4474163"/>
-            <a:ext cx="2232086" cy="369332"/>
+            <a:off x="4178864" y="2469942"/>
+            <a:ext cx="1893884" cy="923330"/>
           </a:xfrm>
           <a:prstGeom prst="rect">
             <a:avLst/>
@@ -5666,7 +4636,7 @@
           <a:noFill/>
         </p:spPr>
         <p:txBody>
-          <a:bodyPr wrap="none" lIns="91440" tIns="45720" rIns="91440" bIns="45720">
+          <a:bodyPr wrap="square" lIns="91440" tIns="45720" rIns="91440" bIns="45720">
             <a:spAutoFit/>
           </a:bodyPr>
           <a:lstStyle/>
@@ -5693,7 +4663,7 @@
                   </a:glow>
                 </a:effectLst>
               </a:rPr>
-              <a:t>Entrar por Professor</a:t>
+              <a:t>Escola E.B. 2,3 Dr. António Chora Barroso</a:t>
             </a:r>
             <a:endParaRPr lang="pt-PT" b="1" cap="none" spc="50" dirty="0">
               <a:ln w="9525" cmpd="sng">
@@ -5718,9 +4688,147 @@
           </a:p>
         </p:txBody>
       </p:sp>
+      <p:sp>
+        <p:nvSpPr>
+          <p:cNvPr id="14" name="Retângulo 13"/>
+          <p:cNvSpPr/>
+          <p:nvPr/>
+        </p:nvSpPr>
+        <p:spPr>
+          <a:xfrm>
+            <a:off x="6103554" y="2469941"/>
+            <a:ext cx="1789512" cy="646331"/>
+          </a:xfrm>
+          <a:prstGeom prst="rect">
+            <a:avLst/>
+          </a:prstGeom>
+          <a:noFill/>
+        </p:spPr>
+        <p:txBody>
+          <a:bodyPr wrap="square" lIns="91440" tIns="45720" rIns="91440" bIns="45720">
+            <a:spAutoFit/>
+          </a:bodyPr>
+          <a:lstStyle/>
+          <a:p>
+            <a:pPr algn="ctr"/>
+            <a:r>
+              <a:rPr lang="pt-PT" b="1" cap="none" spc="50" dirty="0" smtClean="0">
+                <a:ln w="9525" cmpd="sng">
+                  <a:solidFill>
+                    <a:schemeClr val="accent1"/>
+                  </a:solidFill>
+                  <a:prstDash val="solid"/>
+                </a:ln>
+                <a:solidFill>
+                  <a:srgbClr val="70AD47">
+                    <a:tint val="1000"/>
+                  </a:srgbClr>
+                </a:solidFill>
+                <a:effectLst>
+                  <a:glow rad="38100">
+                    <a:schemeClr val="accent1">
+                      <a:alpha val="40000"/>
+                    </a:schemeClr>
+                  </a:glow>
+                </a:effectLst>
+              </a:rPr>
+              <a:t>Centro Escolar da Meia Via</a:t>
+            </a:r>
+            <a:endParaRPr lang="pt-PT" b="1" cap="none" spc="50" dirty="0">
+              <a:ln w="9525" cmpd="sng">
+                <a:solidFill>
+                  <a:schemeClr val="accent1"/>
+                </a:solidFill>
+                <a:prstDash val="solid"/>
+              </a:ln>
+              <a:solidFill>
+                <a:srgbClr val="70AD47">
+                  <a:tint val="1000"/>
+                </a:srgbClr>
+              </a:solidFill>
+              <a:effectLst>
+                <a:glow rad="38100">
+                  <a:schemeClr val="accent1">
+                    <a:alpha val="40000"/>
+                  </a:schemeClr>
+                </a:glow>
+              </a:effectLst>
+            </a:endParaRPr>
+          </a:p>
+        </p:txBody>
+      </p:sp>
+      <p:sp>
+        <p:nvSpPr>
+          <p:cNvPr id="15" name="Retângulo 14"/>
+          <p:cNvSpPr/>
+          <p:nvPr/>
+        </p:nvSpPr>
+        <p:spPr>
+          <a:xfrm>
+            <a:off x="8059789" y="2469940"/>
+            <a:ext cx="1673524" cy="646331"/>
+          </a:xfrm>
+          <a:prstGeom prst="rect">
+            <a:avLst/>
+          </a:prstGeom>
+          <a:noFill/>
+        </p:spPr>
+        <p:txBody>
+          <a:bodyPr wrap="square" lIns="91440" tIns="45720" rIns="91440" bIns="45720">
+            <a:spAutoFit/>
+          </a:bodyPr>
+          <a:lstStyle/>
+          <a:p>
+            <a:pPr algn="ctr"/>
+            <a:r>
+              <a:rPr lang="pt-PT" b="1" cap="none" spc="50" dirty="0" smtClean="0">
+                <a:ln w="9525" cmpd="sng">
+                  <a:solidFill>
+                    <a:schemeClr val="accent1"/>
+                  </a:solidFill>
+                  <a:prstDash val="solid"/>
+                </a:ln>
+                <a:solidFill>
+                  <a:srgbClr val="70AD47">
+                    <a:tint val="1000"/>
+                  </a:srgbClr>
+                </a:solidFill>
+                <a:effectLst>
+                  <a:glow rad="38100">
+                    <a:schemeClr val="accent1">
+                      <a:alpha val="40000"/>
+                    </a:schemeClr>
+                  </a:glow>
+                </a:effectLst>
+              </a:rPr>
+              <a:t>Centro Escolar de Riachos</a:t>
+            </a:r>
+            <a:endParaRPr lang="pt-PT" b="1" cap="none" spc="50" dirty="0">
+              <a:ln w="9525" cmpd="sng">
+                <a:solidFill>
+                  <a:schemeClr val="accent1"/>
+                </a:solidFill>
+                <a:prstDash val="solid"/>
+              </a:ln>
+              <a:solidFill>
+                <a:srgbClr val="70AD47">
+                  <a:tint val="1000"/>
+                </a:srgbClr>
+              </a:solidFill>
+              <a:effectLst>
+                <a:glow rad="38100">
+                  <a:schemeClr val="accent1">
+                    <a:alpha val="40000"/>
+                  </a:schemeClr>
+                </a:glow>
+              </a:effectLst>
+            </a:endParaRPr>
+          </a:p>
+        </p:txBody>
+      </p:sp>
       <p:pic>
         <p:nvPicPr>
-          <p:cNvPr id="12" name="Imagem 11"/>
+          <p:cNvPr id="5" name="Imagem 4"/>
           <p:cNvPicPr>
             <a:picLocks noChangeAspect="1"/>
           </p:cNvPicPr>
@@ -5740,8 +4848,8 @@
         </p:blipFill>
         <p:spPr>
           <a:xfrm>
-            <a:off x="3112153" y="2558034"/>
-            <a:ext cx="1890734" cy="1890734"/>
+            <a:off x="2639887" y="1467768"/>
+            <a:ext cx="1002174" cy="1002174"/>
           </a:xfrm>
           <a:prstGeom prst="rect">
             <a:avLst/>
@@ -5750,14 +4858,14 @@
       </p:pic>
       <p:pic>
         <p:nvPicPr>
-          <p:cNvPr id="14" name="Imagem 13"/>
+          <p:cNvPr id="18" name="Imagem 17"/>
           <p:cNvPicPr>
             <a:picLocks noChangeAspect="1"/>
           </p:cNvPicPr>
           <p:nvPr/>
         </p:nvPicPr>
         <p:blipFill>
-          <a:blip r:embed="rId5">
+          <a:blip r:embed="rId4" cstate="print">
             <a:extLst>
               <a:ext uri="{28A0092B-C50C-407E-A947-70E740481C1C}">
                 <a14:useLocalDpi xmlns:a14="http://schemas.microsoft.com/office/drawing/2010/main" val="0"/>
@@ -5770,8 +4878,8 @@
         </p:blipFill>
         <p:spPr>
           <a:xfrm>
-            <a:off x="6468144" y="2420780"/>
-            <a:ext cx="2053383" cy="2053383"/>
+            <a:off x="4540046" y="1467766"/>
+            <a:ext cx="1002174" cy="1002174"/>
           </a:xfrm>
           <a:prstGeom prst="rect">
             <a:avLst/>
@@ -5780,14 +4888,14 @@
       </p:pic>
       <p:pic>
         <p:nvPicPr>
-          <p:cNvPr id="13" name="Imagem 12"/>
+          <p:cNvPr id="19" name="Imagem 18"/>
           <p:cNvPicPr>
             <a:picLocks noChangeAspect="1"/>
           </p:cNvPicPr>
           <p:nvPr/>
         </p:nvPicPr>
         <p:blipFill>
-          <a:blip r:embed="rId6">
+          <a:blip r:embed="rId4" cstate="print">
             <a:extLst>
               <a:ext uri="{28A0092B-C50C-407E-A947-70E740481C1C}">
                 <a14:useLocalDpi xmlns:a14="http://schemas.microsoft.com/office/drawing/2010/main" val="0"/>
@@ -5800,8 +4908,494 @@
         </p:blipFill>
         <p:spPr>
           <a:xfrm>
-            <a:off x="3289085" y="3171250"/>
-            <a:ext cx="2277539" cy="2277539"/>
+            <a:off x="6440206" y="1467766"/>
+            <a:ext cx="1002174" cy="1002174"/>
+          </a:xfrm>
+          <a:prstGeom prst="rect">
+            <a:avLst/>
+          </a:prstGeom>
+        </p:spPr>
+      </p:pic>
+      <p:pic>
+        <p:nvPicPr>
+          <p:cNvPr id="20" name="Imagem 19"/>
+          <p:cNvPicPr>
+            <a:picLocks noChangeAspect="1"/>
+          </p:cNvPicPr>
+          <p:nvPr/>
+        </p:nvPicPr>
+        <p:blipFill>
+          <a:blip r:embed="rId4" cstate="print">
+            <a:extLst>
+              <a:ext uri="{28A0092B-C50C-407E-A947-70E740481C1C}">
+                <a14:useLocalDpi xmlns:a14="http://schemas.microsoft.com/office/drawing/2010/main" val="0"/>
+              </a:ext>
+            </a:extLst>
+          </a:blip>
+          <a:stretch>
+            <a:fillRect/>
+          </a:stretch>
+        </p:blipFill>
+        <p:spPr>
+          <a:xfrm>
+            <a:off x="8332978" y="1467766"/>
+            <a:ext cx="1002174" cy="1002174"/>
+          </a:xfrm>
+          <a:prstGeom prst="rect">
+            <a:avLst/>
+          </a:prstGeom>
+        </p:spPr>
+      </p:pic>
+      <p:sp>
+        <p:nvSpPr>
+          <p:cNvPr id="30" name="Retângulo 29"/>
+          <p:cNvSpPr/>
+          <p:nvPr/>
+        </p:nvSpPr>
+        <p:spPr>
+          <a:xfrm>
+            <a:off x="2052587" y="4502560"/>
+            <a:ext cx="1938857" cy="646331"/>
+          </a:xfrm>
+          <a:prstGeom prst="rect">
+            <a:avLst/>
+          </a:prstGeom>
+          <a:noFill/>
+        </p:spPr>
+        <p:txBody>
+          <a:bodyPr wrap="square" lIns="91440" tIns="45720" rIns="91440" bIns="45720">
+            <a:spAutoFit/>
+          </a:bodyPr>
+          <a:lstStyle/>
+          <a:p>
+            <a:pPr algn="ctr"/>
+            <a:r>
+              <a:rPr lang="pt-PT" b="1" cap="none" spc="50" dirty="0" smtClean="0">
+                <a:ln w="9525" cmpd="sng">
+                  <a:solidFill>
+                    <a:schemeClr val="accent1"/>
+                  </a:solidFill>
+                  <a:prstDash val="solid"/>
+                </a:ln>
+                <a:solidFill>
+                  <a:srgbClr val="70AD47">
+                    <a:tint val="1000"/>
+                  </a:srgbClr>
+                </a:solidFill>
+                <a:effectLst>
+                  <a:glow rad="38100">
+                    <a:schemeClr val="accent1">
+                      <a:alpha val="40000"/>
+                    </a:schemeClr>
+                  </a:glow>
+                </a:effectLst>
+              </a:rPr>
+              <a:t>Escola E.B. 1 de Sta. Maria</a:t>
+            </a:r>
+            <a:endParaRPr lang="pt-PT" b="1" cap="none" spc="50" dirty="0">
+              <a:ln w="9525" cmpd="sng">
+                <a:solidFill>
+                  <a:schemeClr val="accent1"/>
+                </a:solidFill>
+                <a:prstDash val="solid"/>
+              </a:ln>
+              <a:solidFill>
+                <a:srgbClr val="70AD47">
+                  <a:tint val="1000"/>
+                </a:srgbClr>
+              </a:solidFill>
+              <a:effectLst>
+                <a:glow rad="38100">
+                  <a:schemeClr val="accent1">
+                    <a:alpha val="40000"/>
+                  </a:schemeClr>
+                </a:glow>
+              </a:effectLst>
+            </a:endParaRPr>
+          </a:p>
+        </p:txBody>
+      </p:sp>
+      <p:sp>
+        <p:nvSpPr>
+          <p:cNvPr id="31" name="Retângulo 30"/>
+          <p:cNvSpPr/>
+          <p:nvPr/>
+        </p:nvSpPr>
+        <p:spPr>
+          <a:xfrm>
+            <a:off x="3975233" y="4502560"/>
+            <a:ext cx="1893884" cy="923330"/>
+          </a:xfrm>
+          <a:prstGeom prst="rect">
+            <a:avLst/>
+          </a:prstGeom>
+          <a:noFill/>
+        </p:spPr>
+        <p:txBody>
+          <a:bodyPr wrap="square" lIns="91440" tIns="45720" rIns="91440" bIns="45720">
+            <a:spAutoFit/>
+          </a:bodyPr>
+          <a:lstStyle/>
+          <a:p>
+            <a:pPr algn="ctr"/>
+            <a:r>
+              <a:rPr lang="pt-PT" b="1" cap="none" spc="50" dirty="0" smtClean="0">
+                <a:ln w="9525" cmpd="sng">
+                  <a:solidFill>
+                    <a:schemeClr val="accent1"/>
+                  </a:solidFill>
+                  <a:prstDash val="solid"/>
+                </a:ln>
+                <a:solidFill>
+                  <a:srgbClr val="70AD47">
+                    <a:tint val="1000"/>
+                  </a:srgbClr>
+                </a:solidFill>
+                <a:effectLst>
+                  <a:glow rad="38100">
+                    <a:schemeClr val="accent1">
+                      <a:alpha val="40000"/>
+                    </a:schemeClr>
+                  </a:glow>
+                </a:effectLst>
+              </a:rPr>
+              <a:t>Jardim de Infância de Sta. Maria</a:t>
+            </a:r>
+            <a:endParaRPr lang="pt-PT" b="1" cap="none" spc="50" dirty="0">
+              <a:ln w="9525" cmpd="sng">
+                <a:solidFill>
+                  <a:schemeClr val="accent1"/>
+                </a:solidFill>
+                <a:prstDash val="solid"/>
+              </a:ln>
+              <a:solidFill>
+                <a:srgbClr val="70AD47">
+                  <a:tint val="1000"/>
+                </a:srgbClr>
+              </a:solidFill>
+              <a:effectLst>
+                <a:glow rad="38100">
+                  <a:schemeClr val="accent1">
+                    <a:alpha val="40000"/>
+                  </a:schemeClr>
+                </a:glow>
+              </a:effectLst>
+            </a:endParaRPr>
+          </a:p>
+        </p:txBody>
+      </p:sp>
+      <p:sp>
+        <p:nvSpPr>
+          <p:cNvPr id="32" name="Retângulo 31"/>
+          <p:cNvSpPr/>
+          <p:nvPr/>
+        </p:nvSpPr>
+        <p:spPr>
+          <a:xfrm>
+            <a:off x="5751243" y="4504217"/>
+            <a:ext cx="2040520" cy="923330"/>
+          </a:xfrm>
+          <a:prstGeom prst="rect">
+            <a:avLst/>
+          </a:prstGeom>
+          <a:noFill/>
+        </p:spPr>
+        <p:txBody>
+          <a:bodyPr wrap="square" lIns="91440" tIns="45720" rIns="91440" bIns="45720">
+            <a:spAutoFit/>
+          </a:bodyPr>
+          <a:lstStyle/>
+          <a:p>
+            <a:pPr algn="ctr"/>
+            <a:r>
+              <a:rPr lang="pt-PT" b="1" spc="50" dirty="0" smtClean="0">
+                <a:ln w="9525" cmpd="sng">
+                  <a:solidFill>
+                    <a:schemeClr val="accent1"/>
+                  </a:solidFill>
+                  <a:prstDash val="solid"/>
+                </a:ln>
+                <a:solidFill>
+                  <a:srgbClr val="70AD47">
+                    <a:tint val="1000"/>
+                  </a:srgbClr>
+                </a:solidFill>
+                <a:effectLst>
+                  <a:glow rad="38100">
+                    <a:schemeClr val="accent1">
+                      <a:alpha val="40000"/>
+                    </a:schemeClr>
+                  </a:glow>
+                </a:effectLst>
+              </a:rPr>
+              <a:t>Escola E.B. 1 com jardim de Infância de Liteiros</a:t>
+            </a:r>
+            <a:endParaRPr lang="pt-PT" b="1" cap="none" spc="50" dirty="0">
+              <a:ln w="9525" cmpd="sng">
+                <a:solidFill>
+                  <a:schemeClr val="accent1"/>
+                </a:solidFill>
+                <a:prstDash val="solid"/>
+              </a:ln>
+              <a:solidFill>
+                <a:srgbClr val="70AD47">
+                  <a:tint val="1000"/>
+                </a:srgbClr>
+              </a:solidFill>
+              <a:effectLst>
+                <a:glow rad="38100">
+                  <a:schemeClr val="accent1">
+                    <a:alpha val="40000"/>
+                  </a:schemeClr>
+                </a:glow>
+              </a:effectLst>
+            </a:endParaRPr>
+          </a:p>
+        </p:txBody>
+      </p:sp>
+      <p:sp>
+        <p:nvSpPr>
+          <p:cNvPr id="33" name="Retângulo 32"/>
+          <p:cNvSpPr/>
+          <p:nvPr/>
+        </p:nvSpPr>
+        <p:spPr>
+          <a:xfrm>
+            <a:off x="7693710" y="4502558"/>
+            <a:ext cx="2088186" cy="1200329"/>
+          </a:xfrm>
+          <a:prstGeom prst="rect">
+            <a:avLst/>
+          </a:prstGeom>
+          <a:noFill/>
+        </p:spPr>
+        <p:txBody>
+          <a:bodyPr wrap="square" lIns="91440" tIns="45720" rIns="91440" bIns="45720">
+            <a:spAutoFit/>
+          </a:bodyPr>
+          <a:lstStyle/>
+          <a:p>
+            <a:pPr algn="ctr"/>
+            <a:r>
+              <a:rPr lang="pt-PT" b="1" cap="none" spc="50" dirty="0" smtClean="0">
+                <a:ln w="9525" cmpd="sng">
+                  <a:solidFill>
+                    <a:schemeClr val="accent1"/>
+                  </a:solidFill>
+                  <a:prstDash val="solid"/>
+                </a:ln>
+                <a:solidFill>
+                  <a:srgbClr val="70AD47">
+                    <a:tint val="1000"/>
+                  </a:srgbClr>
+                </a:solidFill>
+                <a:effectLst>
+                  <a:glow rad="38100">
+                    <a:schemeClr val="accent1">
+                      <a:alpha val="40000"/>
+                    </a:schemeClr>
+                  </a:glow>
+                </a:effectLst>
+              </a:rPr>
+              <a:t>Escola E.B. 1 com Jardim de Infância de Parceiros de Igreja</a:t>
+            </a:r>
+            <a:endParaRPr lang="pt-PT" b="1" cap="none" spc="50" dirty="0">
+              <a:ln w="9525" cmpd="sng">
+                <a:solidFill>
+                  <a:schemeClr val="accent1"/>
+                </a:solidFill>
+                <a:prstDash val="solid"/>
+              </a:ln>
+              <a:solidFill>
+                <a:srgbClr val="70AD47">
+                  <a:tint val="1000"/>
+                </a:srgbClr>
+              </a:solidFill>
+              <a:effectLst>
+                <a:glow rad="38100">
+                  <a:schemeClr val="accent1">
+                    <a:alpha val="40000"/>
+                  </a:schemeClr>
+                </a:glow>
+              </a:effectLst>
+            </a:endParaRPr>
+          </a:p>
+        </p:txBody>
+      </p:sp>
+      <p:pic>
+        <p:nvPicPr>
+          <p:cNvPr id="34" name="Imagem 33"/>
+          <p:cNvPicPr>
+            <a:picLocks noChangeAspect="1"/>
+          </p:cNvPicPr>
+          <p:nvPr/>
+        </p:nvPicPr>
+        <p:blipFill>
+          <a:blip r:embed="rId4" cstate="print">
+            <a:extLst>
+              <a:ext uri="{28A0092B-C50C-407E-A947-70E740481C1C}">
+                <a14:useLocalDpi xmlns:a14="http://schemas.microsoft.com/office/drawing/2010/main" val="0"/>
+              </a:ext>
+            </a:extLst>
+          </a:blip>
+          <a:stretch>
+            <a:fillRect/>
+          </a:stretch>
+        </p:blipFill>
+        <p:spPr>
+          <a:xfrm>
+            <a:off x="2371861" y="3500386"/>
+            <a:ext cx="1002174" cy="1002174"/>
+          </a:xfrm>
+          <a:prstGeom prst="rect">
+            <a:avLst/>
+          </a:prstGeom>
+        </p:spPr>
+      </p:pic>
+      <p:pic>
+        <p:nvPicPr>
+          <p:cNvPr id="35" name="Imagem 34"/>
+          <p:cNvPicPr>
+            <a:picLocks noChangeAspect="1"/>
+          </p:cNvPicPr>
+          <p:nvPr/>
+        </p:nvPicPr>
+        <p:blipFill>
+          <a:blip r:embed="rId4" cstate="print">
+            <a:extLst>
+              <a:ext uri="{28A0092B-C50C-407E-A947-70E740481C1C}">
+                <a14:useLocalDpi xmlns:a14="http://schemas.microsoft.com/office/drawing/2010/main" val="0"/>
+              </a:ext>
+            </a:extLst>
+          </a:blip>
+          <a:stretch>
+            <a:fillRect/>
+          </a:stretch>
+        </p:blipFill>
+        <p:spPr>
+          <a:xfrm>
+            <a:off x="4274407" y="3500386"/>
+            <a:ext cx="1002174" cy="1002174"/>
+          </a:xfrm>
+          <a:prstGeom prst="rect">
+            <a:avLst/>
+          </a:prstGeom>
+        </p:spPr>
+      </p:pic>
+      <p:pic>
+        <p:nvPicPr>
+          <p:cNvPr id="36" name="Imagem 35"/>
+          <p:cNvPicPr>
+            <a:picLocks noChangeAspect="1"/>
+          </p:cNvPicPr>
+          <p:nvPr/>
+        </p:nvPicPr>
+        <p:blipFill>
+          <a:blip r:embed="rId4" cstate="print">
+            <a:extLst>
+              <a:ext uri="{28A0092B-C50C-407E-A947-70E740481C1C}">
+                <a14:useLocalDpi xmlns:a14="http://schemas.microsoft.com/office/drawing/2010/main" val="0"/>
+              </a:ext>
+            </a:extLst>
+          </a:blip>
+          <a:stretch>
+            <a:fillRect/>
+          </a:stretch>
+        </p:blipFill>
+        <p:spPr>
+          <a:xfrm>
+            <a:off x="6172180" y="3500384"/>
+            <a:ext cx="1002174" cy="1002174"/>
+          </a:xfrm>
+          <a:prstGeom prst="rect">
+            <a:avLst/>
+          </a:prstGeom>
+        </p:spPr>
+      </p:pic>
+      <p:pic>
+        <p:nvPicPr>
+          <p:cNvPr id="37" name="Imagem 36"/>
+          <p:cNvPicPr>
+            <a:picLocks noChangeAspect="1"/>
+          </p:cNvPicPr>
+          <p:nvPr/>
+        </p:nvPicPr>
+        <p:blipFill>
+          <a:blip r:embed="rId4" cstate="print">
+            <a:extLst>
+              <a:ext uri="{28A0092B-C50C-407E-A947-70E740481C1C}">
+                <a14:useLocalDpi xmlns:a14="http://schemas.microsoft.com/office/drawing/2010/main" val="0"/>
+              </a:ext>
+            </a:extLst>
+          </a:blip>
+          <a:stretch>
+            <a:fillRect/>
+          </a:stretch>
+        </p:blipFill>
+        <p:spPr>
+          <a:xfrm>
+            <a:off x="8064952" y="3500384"/>
+            <a:ext cx="1002174" cy="1002174"/>
+          </a:xfrm>
+          <a:prstGeom prst="rect">
+            <a:avLst/>
+          </a:prstGeom>
+        </p:spPr>
+      </p:pic>
+      <p:pic>
+        <p:nvPicPr>
+          <p:cNvPr id="22" name="Imagem 21"/>
+          <p:cNvPicPr>
+            <a:picLocks noChangeAspect="1"/>
+          </p:cNvPicPr>
+          <p:nvPr/>
+        </p:nvPicPr>
+        <p:blipFill>
+          <a:blip r:embed="rId5" cstate="print">
+            <a:extLst>
+              <a:ext uri="{28A0092B-C50C-407E-A947-70E740481C1C}">
+                <a14:useLocalDpi xmlns:a14="http://schemas.microsoft.com/office/drawing/2010/main" val="0"/>
+              </a:ext>
+            </a:extLst>
+          </a:blip>
+          <a:stretch>
+            <a:fillRect/>
+          </a:stretch>
+        </p:blipFill>
+        <p:spPr>
+          <a:xfrm>
+            <a:off x="2515510" y="1661759"/>
+            <a:ext cx="1526455" cy="1526455"/>
+          </a:xfrm>
+          <a:prstGeom prst="rect">
+            <a:avLst/>
+          </a:prstGeom>
+        </p:spPr>
+      </p:pic>
+      <p:pic>
+        <p:nvPicPr>
+          <p:cNvPr id="23" name="Imagem 22"/>
+          <p:cNvPicPr>
+            <a:picLocks noChangeAspect="1"/>
+          </p:cNvPicPr>
+          <p:nvPr/>
+        </p:nvPicPr>
+        <p:blipFill>
+          <a:blip r:embed="rId6" cstate="print">
+            <a:extLst>
+              <a:ext uri="{28A0092B-C50C-407E-A947-70E740481C1C}">
+                <a14:useLocalDpi xmlns:a14="http://schemas.microsoft.com/office/drawing/2010/main" val="0"/>
+              </a:ext>
+            </a:extLst>
+          </a:blip>
+          <a:stretch>
+            <a:fillRect/>
+          </a:stretch>
+        </p:blipFill>
+        <p:spPr>
+          <a:xfrm>
+            <a:off x="9160943" y="948943"/>
+            <a:ext cx="518823" cy="518823"/>
           </a:xfrm>
           <a:prstGeom prst="rect">
             <a:avLst/>
@@ -5811,7 +5405,7 @@
     </p:spTree>
     <p:extLst>
       <p:ext uri="{BB962C8B-B14F-4D97-AF65-F5344CB8AC3E}">
-        <p14:creationId xmlns:p14="http://schemas.microsoft.com/office/powerpoint/2010/main" val="966913034"/>
+        <p14:creationId xmlns:p14="http://schemas.microsoft.com/office/powerpoint/2010/main" val="1990497307"/>
       </p:ext>
     </p:extLst>
   </p:cSld>
@@ -5852,7 +5446,7 @@
                                           </p:stCondLst>
                                         </p:cTn>
                                         <p:tgtEl>
-                                          <p:spTgt spid="13"/>
+                                          <p:spTgt spid="22"/>
                                         </p:tgtEl>
                                         <p:attrNameLst>
                                           <p:attrName>style.visibility</p:attrName>
@@ -5951,7 +5545,7 @@
         </p:nvSpPr>
         <p:spPr>
           <a:xfrm>
-            <a:off x="1912511" y="946286"/>
+            <a:off x="1906073" y="953037"/>
             <a:ext cx="7856113" cy="4919729"/>
           </a:xfrm>
           <a:prstGeom prst="rect">
@@ -6061,14 +5655,14 @@
       </p:sp>
       <p:sp>
         <p:nvSpPr>
-          <p:cNvPr id="12" name="Retângulo 11"/>
+          <p:cNvPr id="7" name="Retângulo 6"/>
           <p:cNvSpPr/>
           <p:nvPr/>
         </p:nvSpPr>
         <p:spPr>
           <a:xfrm>
-            <a:off x="2038689" y="2469942"/>
-            <a:ext cx="2220781" cy="923330"/>
+            <a:off x="2698963" y="1241566"/>
+            <a:ext cx="4822299" cy="369332"/>
           </a:xfrm>
           <a:prstGeom prst="rect">
             <a:avLst/>
@@ -6128,16 +5722,196 @@
           </a:p>
         </p:txBody>
       </p:sp>
-      <p:sp>
-        <p:nvSpPr>
-          <p:cNvPr id="13" name="Retângulo 12"/>
+      <p:pic>
+        <p:nvPicPr>
+          <p:cNvPr id="4" name="Imagem 3"/>
+          <p:cNvPicPr>
+            <a:picLocks noChangeAspect="1"/>
+          </p:cNvPicPr>
+          <p:nvPr/>
+        </p:nvPicPr>
+        <p:blipFill>
+          <a:blip r:embed="rId4" cstate="print">
+            <a:extLst>
+              <a:ext uri="{28A0092B-C50C-407E-A947-70E740481C1C}">
+                <a14:useLocalDpi xmlns:a14="http://schemas.microsoft.com/office/drawing/2010/main" val="0"/>
+              </a:ext>
+            </a:extLst>
+          </a:blip>
+          <a:stretch>
+            <a:fillRect/>
+          </a:stretch>
+        </p:blipFill>
+        <p:spPr>
+          <a:xfrm>
+            <a:off x="2627008" y="1991760"/>
+            <a:ext cx="888174" cy="889654"/>
+          </a:xfrm>
+          <a:prstGeom prst="rect">
+            <a:avLst/>
+          </a:prstGeom>
+        </p:spPr>
+      </p:pic>
+      <p:pic>
+        <p:nvPicPr>
+          <p:cNvPr id="10" name="Imagem 9"/>
+          <p:cNvPicPr>
+            <a:picLocks noChangeAspect="1"/>
+          </p:cNvPicPr>
+          <p:nvPr/>
+        </p:nvPicPr>
+        <p:blipFill>
+          <a:blip r:embed="rId4" cstate="print">
+            <a:extLst>
+              <a:ext uri="{28A0092B-C50C-407E-A947-70E740481C1C}">
+                <a14:useLocalDpi xmlns:a14="http://schemas.microsoft.com/office/drawing/2010/main" val="0"/>
+              </a:ext>
+            </a:extLst>
+          </a:blip>
+          <a:stretch>
+            <a:fillRect/>
+          </a:stretch>
+        </p:blipFill>
+        <p:spPr>
+          <a:xfrm>
+            <a:off x="4455340" y="1991760"/>
+            <a:ext cx="888174" cy="889654"/>
+          </a:xfrm>
+          <a:prstGeom prst="rect">
+            <a:avLst/>
+          </a:prstGeom>
+        </p:spPr>
+      </p:pic>
+      <p:pic>
+        <p:nvPicPr>
+          <p:cNvPr id="11" name="Imagem 10"/>
+          <p:cNvPicPr>
+            <a:picLocks noChangeAspect="1"/>
+          </p:cNvPicPr>
+          <p:nvPr/>
+        </p:nvPicPr>
+        <p:blipFill>
+          <a:blip r:embed="rId4" cstate="print">
+            <a:extLst>
+              <a:ext uri="{28A0092B-C50C-407E-A947-70E740481C1C}">
+                <a14:useLocalDpi xmlns:a14="http://schemas.microsoft.com/office/drawing/2010/main" val="0"/>
+              </a:ext>
+            </a:extLst>
+          </a:blip>
+          <a:stretch>
+            <a:fillRect/>
+          </a:stretch>
+        </p:blipFill>
+        <p:spPr>
+          <a:xfrm>
+            <a:off x="2736801" y="3818414"/>
+            <a:ext cx="888174" cy="889654"/>
+          </a:xfrm>
+          <a:prstGeom prst="rect">
+            <a:avLst/>
+          </a:prstGeom>
+        </p:spPr>
+      </p:pic>
+      <p:pic>
+        <p:nvPicPr>
+          <p:cNvPr id="12" name="Imagem 11"/>
+          <p:cNvPicPr>
+            <a:picLocks noChangeAspect="1"/>
+          </p:cNvPicPr>
+          <p:nvPr/>
+        </p:nvPicPr>
+        <p:blipFill>
+          <a:blip r:embed="rId4" cstate="print">
+            <a:extLst>
+              <a:ext uri="{28A0092B-C50C-407E-A947-70E740481C1C}">
+                <a14:useLocalDpi xmlns:a14="http://schemas.microsoft.com/office/drawing/2010/main" val="0"/>
+              </a:ext>
+            </a:extLst>
+          </a:blip>
+          <a:stretch>
+            <a:fillRect/>
+          </a:stretch>
+        </p:blipFill>
+        <p:spPr>
+          <a:xfrm>
+            <a:off x="7962617" y="1992845"/>
+            <a:ext cx="888174" cy="889654"/>
+          </a:xfrm>
+          <a:prstGeom prst="rect">
+            <a:avLst/>
+          </a:prstGeom>
+        </p:spPr>
+      </p:pic>
+      <p:pic>
+        <p:nvPicPr>
+          <p:cNvPr id="5" name="Imagem 4"/>
+          <p:cNvPicPr>
+            <a:picLocks noChangeAspect="1"/>
+          </p:cNvPicPr>
+          <p:nvPr/>
+        </p:nvPicPr>
+        <p:blipFill>
+          <a:blip r:embed="rId5" cstate="print">
+            <a:extLst>
+              <a:ext uri="{28A0092B-C50C-407E-A947-70E740481C1C}">
+                <a14:useLocalDpi xmlns:a14="http://schemas.microsoft.com/office/drawing/2010/main" val="0"/>
+              </a:ext>
+            </a:extLst>
+          </a:blip>
+          <a:stretch>
+            <a:fillRect/>
+          </a:stretch>
+        </p:blipFill>
+        <p:spPr>
+          <a:xfrm>
+            <a:off x="5952267" y="1876367"/>
+            <a:ext cx="1070192" cy="1070192"/>
+          </a:xfrm>
+          <a:prstGeom prst="rect">
+            <a:avLst/>
+          </a:prstGeom>
+        </p:spPr>
+      </p:pic>
+      <p:pic>
+        <p:nvPicPr>
+          <p:cNvPr id="14" name="Imagem 13"/>
+          <p:cNvPicPr>
+            <a:picLocks noChangeAspect="1"/>
+          </p:cNvPicPr>
+          <p:nvPr/>
+        </p:nvPicPr>
+        <p:blipFill>
+          <a:blip r:embed="rId5" cstate="print">
+            <a:extLst>
+              <a:ext uri="{28A0092B-C50C-407E-A947-70E740481C1C}">
+                <a14:useLocalDpi xmlns:a14="http://schemas.microsoft.com/office/drawing/2010/main" val="0"/>
+              </a:ext>
+            </a:extLst>
+          </a:blip>
+          <a:stretch>
+            <a:fillRect/>
+          </a:stretch>
+        </p:blipFill>
+        <p:spPr>
+          <a:xfrm>
+            <a:off x="4384648" y="3728145"/>
+            <a:ext cx="1070192" cy="1070192"/>
+          </a:xfrm>
+          <a:prstGeom prst="rect">
+            <a:avLst/>
+          </a:prstGeom>
+        </p:spPr>
+      </p:pic>
+      <p:sp>
+        <p:nvSpPr>
+          <p:cNvPr id="15" name="Retângulo 14"/>
           <p:cNvSpPr/>
           <p:nvPr/>
         </p:nvSpPr>
         <p:spPr>
           <a:xfrm>
-            <a:off x="4178864" y="2469942"/>
-            <a:ext cx="1893884" cy="923330"/>
+            <a:off x="2371150" y="2988184"/>
+            <a:ext cx="1425857" cy="646331"/>
           </a:xfrm>
           <a:prstGeom prst="rect">
             <a:avLst/>
@@ -6152,7 +5926,7 @@
           <a:p>
             <a:pPr algn="ctr"/>
             <a:r>
-              <a:rPr lang="pt-PT" b="1" cap="none" spc="50" dirty="0" smtClean="0">
+              <a:rPr lang="pt-PT" b="1" spc="50" dirty="0" smtClean="0">
                 <a:ln w="9525" cmpd="sng">
                   <a:solidFill>
                     <a:schemeClr val="accent1"/>
@@ -6172,7 +5946,7 @@
                   </a:glow>
                 </a:effectLst>
               </a:rPr>
-              <a:t>Escola E.B. 2,3 Dr. António Chora Barroso</a:t>
+              <a:t>Prof. Ângela Cruz</a:t>
             </a:r>
             <a:endParaRPr lang="pt-PT" b="1" cap="none" spc="50" dirty="0">
               <a:ln w="9525" cmpd="sng">
@@ -6199,14 +5973,14 @@
       </p:sp>
       <p:sp>
         <p:nvSpPr>
-          <p:cNvPr id="14" name="Retângulo 13"/>
+          <p:cNvPr id="16" name="Retângulo 15"/>
           <p:cNvSpPr/>
           <p:nvPr/>
         </p:nvSpPr>
         <p:spPr>
           <a:xfrm>
-            <a:off x="6103554" y="2469941"/>
-            <a:ext cx="1789512" cy="646331"/>
+            <a:off x="4066300" y="2946559"/>
+            <a:ext cx="1425857" cy="646331"/>
           </a:xfrm>
           <a:prstGeom prst="rect">
             <a:avLst/>
@@ -6221,7 +5995,7 @@
           <a:p>
             <a:pPr algn="ctr"/>
             <a:r>
-              <a:rPr lang="pt-PT" b="1" cap="none" spc="50" dirty="0" smtClean="0">
+              <a:rPr lang="pt-PT" b="1" spc="50" dirty="0" smtClean="0">
                 <a:ln w="9525" cmpd="sng">
                   <a:solidFill>
                     <a:schemeClr val="accent1"/>
@@ -6241,7 +6015,7 @@
                   </a:glow>
                 </a:effectLst>
               </a:rPr>
-              <a:t>Centro Escolar da Meia Via</a:t>
+              <a:t>Prof. Liliana Santos</a:t>
             </a:r>
             <a:endParaRPr lang="pt-PT" b="1" cap="none" spc="50" dirty="0">
               <a:ln w="9525" cmpd="sng">
@@ -6268,14 +6042,14 @@
       </p:sp>
       <p:sp>
         <p:nvSpPr>
-          <p:cNvPr id="15" name="Retângulo 14"/>
+          <p:cNvPr id="17" name="Retângulo 16"/>
           <p:cNvSpPr/>
           <p:nvPr/>
         </p:nvSpPr>
         <p:spPr>
           <a:xfrm>
-            <a:off x="8059789" y="2469940"/>
-            <a:ext cx="1673524" cy="646331"/>
+            <a:off x="5774434" y="2991192"/>
+            <a:ext cx="1425857" cy="646331"/>
           </a:xfrm>
           <a:prstGeom prst="rect">
             <a:avLst/>
@@ -6290,7 +6064,7 @@
           <a:p>
             <a:pPr algn="ctr"/>
             <a:r>
-              <a:rPr lang="pt-PT" b="1" cap="none" spc="50" dirty="0" smtClean="0">
+              <a:rPr lang="pt-PT" b="1" spc="50" dirty="0" smtClean="0">
                 <a:ln w="9525" cmpd="sng">
                   <a:solidFill>
                     <a:schemeClr val="accent1"/>
@@ -6310,7 +6084,7 @@
                   </a:glow>
                 </a:effectLst>
               </a:rPr>
-              <a:t>Centro Escolar de Riachos</a:t>
+              <a:t>Prof. Márcio Figueiredo</a:t>
             </a:r>
             <a:endParaRPr lang="pt-PT" b="1" cap="none" spc="50" dirty="0">
               <a:ln w="9525" cmpd="sng">
@@ -6335,136 +6109,16 @@
           </a:p>
         </p:txBody>
       </p:sp>
-      <p:pic>
-        <p:nvPicPr>
-          <p:cNvPr id="5" name="Imagem 4"/>
-          <p:cNvPicPr>
-            <a:picLocks noChangeAspect="1"/>
-          </p:cNvPicPr>
-          <p:nvPr/>
-        </p:nvPicPr>
-        <p:blipFill>
-          <a:blip r:embed="rId4" cstate="print">
-            <a:extLst>
-              <a:ext uri="{28A0092B-C50C-407E-A947-70E740481C1C}">
-                <a14:useLocalDpi xmlns:a14="http://schemas.microsoft.com/office/drawing/2010/main" val="0"/>
-              </a:ext>
-            </a:extLst>
-          </a:blip>
-          <a:stretch>
-            <a:fillRect/>
-          </a:stretch>
-        </p:blipFill>
-        <p:spPr>
-          <a:xfrm>
-            <a:off x="2639887" y="1467768"/>
-            <a:ext cx="1002174" cy="1002174"/>
-          </a:xfrm>
-          <a:prstGeom prst="rect">
-            <a:avLst/>
-          </a:prstGeom>
-        </p:spPr>
-      </p:pic>
-      <p:pic>
-        <p:nvPicPr>
-          <p:cNvPr id="18" name="Imagem 17"/>
-          <p:cNvPicPr>
-            <a:picLocks noChangeAspect="1"/>
-          </p:cNvPicPr>
-          <p:nvPr/>
-        </p:nvPicPr>
-        <p:blipFill>
-          <a:blip r:embed="rId4" cstate="print">
-            <a:extLst>
-              <a:ext uri="{28A0092B-C50C-407E-A947-70E740481C1C}">
-                <a14:useLocalDpi xmlns:a14="http://schemas.microsoft.com/office/drawing/2010/main" val="0"/>
-              </a:ext>
-            </a:extLst>
-          </a:blip>
-          <a:stretch>
-            <a:fillRect/>
-          </a:stretch>
-        </p:blipFill>
-        <p:spPr>
-          <a:xfrm>
-            <a:off x="4540046" y="1467766"/>
-            <a:ext cx="1002174" cy="1002174"/>
-          </a:xfrm>
-          <a:prstGeom prst="rect">
-            <a:avLst/>
-          </a:prstGeom>
-        </p:spPr>
-      </p:pic>
-      <p:pic>
-        <p:nvPicPr>
-          <p:cNvPr id="19" name="Imagem 18"/>
-          <p:cNvPicPr>
-            <a:picLocks noChangeAspect="1"/>
-          </p:cNvPicPr>
-          <p:nvPr/>
-        </p:nvPicPr>
-        <p:blipFill>
-          <a:blip r:embed="rId4" cstate="print">
-            <a:extLst>
-              <a:ext uri="{28A0092B-C50C-407E-A947-70E740481C1C}">
-                <a14:useLocalDpi xmlns:a14="http://schemas.microsoft.com/office/drawing/2010/main" val="0"/>
-              </a:ext>
-            </a:extLst>
-          </a:blip>
-          <a:stretch>
-            <a:fillRect/>
-          </a:stretch>
-        </p:blipFill>
-        <p:spPr>
-          <a:xfrm>
-            <a:off x="6440206" y="1467766"/>
-            <a:ext cx="1002174" cy="1002174"/>
-          </a:xfrm>
-          <a:prstGeom prst="rect">
-            <a:avLst/>
-          </a:prstGeom>
-        </p:spPr>
-      </p:pic>
-      <p:pic>
-        <p:nvPicPr>
-          <p:cNvPr id="20" name="Imagem 19"/>
-          <p:cNvPicPr>
-            <a:picLocks noChangeAspect="1"/>
-          </p:cNvPicPr>
-          <p:nvPr/>
-        </p:nvPicPr>
-        <p:blipFill>
-          <a:blip r:embed="rId4" cstate="print">
-            <a:extLst>
-              <a:ext uri="{28A0092B-C50C-407E-A947-70E740481C1C}">
-                <a14:useLocalDpi xmlns:a14="http://schemas.microsoft.com/office/drawing/2010/main" val="0"/>
-              </a:ext>
-            </a:extLst>
-          </a:blip>
-          <a:stretch>
-            <a:fillRect/>
-          </a:stretch>
-        </p:blipFill>
-        <p:spPr>
-          <a:xfrm>
-            <a:off x="8332978" y="1467766"/>
-            <a:ext cx="1002174" cy="1002174"/>
-          </a:xfrm>
-          <a:prstGeom prst="rect">
-            <a:avLst/>
-          </a:prstGeom>
-        </p:spPr>
-      </p:pic>
-      <p:sp>
-        <p:nvSpPr>
-          <p:cNvPr id="30" name="Retângulo 29"/>
+      <p:sp>
+        <p:nvSpPr>
+          <p:cNvPr id="18" name="Retângulo 17"/>
           <p:cNvSpPr/>
           <p:nvPr/>
         </p:nvSpPr>
         <p:spPr>
           <a:xfrm>
-            <a:off x="2052587" y="4502560"/>
-            <a:ext cx="1938857" cy="646331"/>
+            <a:off x="7521262" y="2988183"/>
+            <a:ext cx="1656456" cy="646331"/>
           </a:xfrm>
           <a:prstGeom prst="rect">
             <a:avLst/>
@@ -6479,7 +6133,7 @@
           <a:p>
             <a:pPr algn="ctr"/>
             <a:r>
-              <a:rPr lang="pt-PT" b="1" cap="none" spc="50" dirty="0" smtClean="0">
+              <a:rPr lang="pt-PT" b="1" spc="50" dirty="0" smtClean="0">
                 <a:ln w="9525" cmpd="sng">
                   <a:solidFill>
                     <a:schemeClr val="accent1"/>
@@ -6499,7 +6153,7 @@
                   </a:glow>
                 </a:effectLst>
               </a:rPr>
-              <a:t>Escola E.B. 1 de Sta. Maria</a:t>
+              <a:t>Prof. Manuela Ferrão </a:t>
             </a:r>
             <a:endParaRPr lang="pt-PT" b="1" cap="none" spc="50" dirty="0">
               <a:ln w="9525" cmpd="sng">
@@ -6526,14 +6180,14 @@
       </p:sp>
       <p:sp>
         <p:nvSpPr>
-          <p:cNvPr id="31" name="Retângulo 30"/>
+          <p:cNvPr id="19" name="Retângulo 18"/>
           <p:cNvSpPr/>
           <p:nvPr/>
         </p:nvSpPr>
         <p:spPr>
           <a:xfrm>
-            <a:off x="3975233" y="4502560"/>
-            <a:ext cx="1893884" cy="923330"/>
+            <a:off x="2432432" y="4798337"/>
+            <a:ext cx="1425857" cy="646331"/>
           </a:xfrm>
           <a:prstGeom prst="rect">
             <a:avLst/>
@@ -6548,7 +6202,7 @@
           <a:p>
             <a:pPr algn="ctr"/>
             <a:r>
-              <a:rPr lang="pt-PT" b="1" cap="none" spc="50" dirty="0" smtClean="0">
+              <a:rPr lang="pt-PT" b="1" spc="50" dirty="0" smtClean="0">
                 <a:ln w="9525" cmpd="sng">
                   <a:solidFill>
                     <a:schemeClr val="accent1"/>
@@ -6568,7 +6222,7 @@
                   </a:glow>
                 </a:effectLst>
               </a:rPr>
-              <a:t>Jardim de Infância de Sta. Maria</a:t>
+              <a:t>Prof. Marisa Leitão</a:t>
             </a:r>
             <a:endParaRPr lang="pt-PT" b="1" cap="none" spc="50" dirty="0">
               <a:ln w="9525" cmpd="sng">
@@ -6595,14 +6249,14 @@
       </p:sp>
       <p:sp>
         <p:nvSpPr>
-          <p:cNvPr id="32" name="Retângulo 31"/>
+          <p:cNvPr id="20" name="Retângulo 19"/>
           <p:cNvSpPr/>
           <p:nvPr/>
         </p:nvSpPr>
         <p:spPr>
           <a:xfrm>
-            <a:off x="5751243" y="4504217"/>
-            <a:ext cx="2040520" cy="923330"/>
+            <a:off x="4186498" y="4836284"/>
+            <a:ext cx="1425857" cy="646331"/>
           </a:xfrm>
           <a:prstGeom prst="rect">
             <a:avLst/>
@@ -6637,7 +6291,7 @@
                   </a:glow>
                 </a:effectLst>
               </a:rPr>
-              <a:t>Escola E.B. 1 com jardim de Infância de Liteiros</a:t>
+              <a:t>Prof. Luís Gomes</a:t>
             </a:r>
             <a:endParaRPr lang="pt-PT" b="1" cap="none" spc="50" dirty="0">
               <a:ln w="9525" cmpd="sng">
@@ -6662,228 +6316,9 @@
           </a:p>
         </p:txBody>
       </p:sp>
-      <p:sp>
-        <p:nvSpPr>
-          <p:cNvPr id="33" name="Retângulo 32"/>
-          <p:cNvSpPr/>
-          <p:nvPr/>
-        </p:nvSpPr>
-        <p:spPr>
-          <a:xfrm>
-            <a:off x="7693710" y="4502558"/>
-            <a:ext cx="2088186" cy="1200329"/>
-          </a:xfrm>
-          <a:prstGeom prst="rect">
-            <a:avLst/>
-          </a:prstGeom>
-          <a:noFill/>
-        </p:spPr>
-        <p:txBody>
-          <a:bodyPr wrap="square" lIns="91440" tIns="45720" rIns="91440" bIns="45720">
-            <a:spAutoFit/>
-          </a:bodyPr>
-          <a:lstStyle/>
-          <a:p>
-            <a:pPr algn="ctr"/>
-            <a:r>
-              <a:rPr lang="pt-PT" b="1" cap="none" spc="50" dirty="0" smtClean="0">
-                <a:ln w="9525" cmpd="sng">
-                  <a:solidFill>
-                    <a:schemeClr val="accent1"/>
-                  </a:solidFill>
-                  <a:prstDash val="solid"/>
-                </a:ln>
-                <a:solidFill>
-                  <a:srgbClr val="70AD47">
-                    <a:tint val="1000"/>
-                  </a:srgbClr>
-                </a:solidFill>
-                <a:effectLst>
-                  <a:glow rad="38100">
-                    <a:schemeClr val="accent1">
-                      <a:alpha val="40000"/>
-                    </a:schemeClr>
-                  </a:glow>
-                </a:effectLst>
-              </a:rPr>
-              <a:t>Escola E.B. 1 com Jardim de Infância de Parceiros de Igreja</a:t>
-            </a:r>
-            <a:endParaRPr lang="pt-PT" b="1" cap="none" spc="50" dirty="0">
-              <a:ln w="9525" cmpd="sng">
-                <a:solidFill>
-                  <a:schemeClr val="accent1"/>
-                </a:solidFill>
-                <a:prstDash val="solid"/>
-              </a:ln>
-              <a:solidFill>
-                <a:srgbClr val="70AD47">
-                  <a:tint val="1000"/>
-                </a:srgbClr>
-              </a:solidFill>
-              <a:effectLst>
-                <a:glow rad="38100">
-                  <a:schemeClr val="accent1">
-                    <a:alpha val="40000"/>
-                  </a:schemeClr>
-                </a:glow>
-              </a:effectLst>
-            </a:endParaRPr>
-          </a:p>
-        </p:txBody>
-      </p:sp>
       <p:pic>
         <p:nvPicPr>
-          <p:cNvPr id="34" name="Imagem 33"/>
-          <p:cNvPicPr>
-            <a:picLocks noChangeAspect="1"/>
-          </p:cNvPicPr>
-          <p:nvPr/>
-        </p:nvPicPr>
-        <p:blipFill>
-          <a:blip r:embed="rId4" cstate="print">
-            <a:extLst>
-              <a:ext uri="{28A0092B-C50C-407E-A947-70E740481C1C}">
-                <a14:useLocalDpi xmlns:a14="http://schemas.microsoft.com/office/drawing/2010/main" val="0"/>
-              </a:ext>
-            </a:extLst>
-          </a:blip>
-          <a:stretch>
-            <a:fillRect/>
-          </a:stretch>
-        </p:blipFill>
-        <p:spPr>
-          <a:xfrm>
-            <a:off x="2371861" y="3500386"/>
-            <a:ext cx="1002174" cy="1002174"/>
-          </a:xfrm>
-          <a:prstGeom prst="rect">
-            <a:avLst/>
-          </a:prstGeom>
-        </p:spPr>
-      </p:pic>
-      <p:pic>
-        <p:nvPicPr>
-          <p:cNvPr id="35" name="Imagem 34"/>
-          <p:cNvPicPr>
-            <a:picLocks noChangeAspect="1"/>
-          </p:cNvPicPr>
-          <p:nvPr/>
-        </p:nvPicPr>
-        <p:blipFill>
-          <a:blip r:embed="rId4" cstate="print">
-            <a:extLst>
-              <a:ext uri="{28A0092B-C50C-407E-A947-70E740481C1C}">
-                <a14:useLocalDpi xmlns:a14="http://schemas.microsoft.com/office/drawing/2010/main" val="0"/>
-              </a:ext>
-            </a:extLst>
-          </a:blip>
-          <a:stretch>
-            <a:fillRect/>
-          </a:stretch>
-        </p:blipFill>
-        <p:spPr>
-          <a:xfrm>
-            <a:off x="4274407" y="3500386"/>
-            <a:ext cx="1002174" cy="1002174"/>
-          </a:xfrm>
-          <a:prstGeom prst="rect">
-            <a:avLst/>
-          </a:prstGeom>
-        </p:spPr>
-      </p:pic>
-      <p:pic>
-        <p:nvPicPr>
-          <p:cNvPr id="36" name="Imagem 35"/>
-          <p:cNvPicPr>
-            <a:picLocks noChangeAspect="1"/>
-          </p:cNvPicPr>
-          <p:nvPr/>
-        </p:nvPicPr>
-        <p:blipFill>
-          <a:blip r:embed="rId4" cstate="print">
-            <a:extLst>
-              <a:ext uri="{28A0092B-C50C-407E-A947-70E740481C1C}">
-                <a14:useLocalDpi xmlns:a14="http://schemas.microsoft.com/office/drawing/2010/main" val="0"/>
-              </a:ext>
-            </a:extLst>
-          </a:blip>
-          <a:stretch>
-            <a:fillRect/>
-          </a:stretch>
-        </p:blipFill>
-        <p:spPr>
-          <a:xfrm>
-            <a:off x="6172180" y="3500384"/>
-            <a:ext cx="1002174" cy="1002174"/>
-          </a:xfrm>
-          <a:prstGeom prst="rect">
-            <a:avLst/>
-          </a:prstGeom>
-        </p:spPr>
-      </p:pic>
-      <p:pic>
-        <p:nvPicPr>
-          <p:cNvPr id="37" name="Imagem 36"/>
-          <p:cNvPicPr>
-            <a:picLocks noChangeAspect="1"/>
-          </p:cNvPicPr>
-          <p:nvPr/>
-        </p:nvPicPr>
-        <p:blipFill>
-          <a:blip r:embed="rId4" cstate="print">
-            <a:extLst>
-              <a:ext uri="{28A0092B-C50C-407E-A947-70E740481C1C}">
-                <a14:useLocalDpi xmlns:a14="http://schemas.microsoft.com/office/drawing/2010/main" val="0"/>
-              </a:ext>
-            </a:extLst>
-          </a:blip>
-          <a:stretch>
-            <a:fillRect/>
-          </a:stretch>
-        </p:blipFill>
-        <p:spPr>
-          <a:xfrm>
-            <a:off x="8064952" y="3500384"/>
-            <a:ext cx="1002174" cy="1002174"/>
-          </a:xfrm>
-          <a:prstGeom prst="rect">
-            <a:avLst/>
-          </a:prstGeom>
-        </p:spPr>
-      </p:pic>
-      <p:pic>
-        <p:nvPicPr>
-          <p:cNvPr id="22" name="Imagem 21"/>
-          <p:cNvPicPr>
-            <a:picLocks noChangeAspect="1"/>
-          </p:cNvPicPr>
-          <p:nvPr/>
-        </p:nvPicPr>
-        <p:blipFill>
-          <a:blip r:embed="rId5" cstate="print">
-            <a:extLst>
-              <a:ext uri="{28A0092B-C50C-407E-A947-70E740481C1C}">
-                <a14:useLocalDpi xmlns:a14="http://schemas.microsoft.com/office/drawing/2010/main" val="0"/>
-              </a:ext>
-            </a:extLst>
-          </a:blip>
-          <a:stretch>
-            <a:fillRect/>
-          </a:stretch>
-        </p:blipFill>
-        <p:spPr>
-          <a:xfrm>
-            <a:off x="2515510" y="1661759"/>
-            <a:ext cx="1526455" cy="1526455"/>
-          </a:xfrm>
-          <a:prstGeom prst="rect">
-            <a:avLst/>
-          </a:prstGeom>
-        </p:spPr>
-      </p:pic>
-      <p:pic>
-        <p:nvPicPr>
-          <p:cNvPr id="23" name="Imagem 22"/>
+          <p:cNvPr id="21" name="Imagem 20"/>
           <p:cNvPicPr>
             <a:picLocks noChangeAspect="1"/>
           </p:cNvPicPr>
@@ -6903,8 +6338,38 @@
         </p:blipFill>
         <p:spPr>
           <a:xfrm>
-            <a:off x="9160943" y="948943"/>
+            <a:off x="9151960" y="5353943"/>
             <a:ext cx="518823" cy="518823"/>
+          </a:xfrm>
+          <a:prstGeom prst="rect">
+            <a:avLst/>
+          </a:prstGeom>
+        </p:spPr>
+      </p:pic>
+      <p:pic>
+        <p:nvPicPr>
+          <p:cNvPr id="22" name="Imagem 21"/>
+          <p:cNvPicPr>
+            <a:picLocks noChangeAspect="1"/>
+          </p:cNvPicPr>
+          <p:nvPr/>
+        </p:nvPicPr>
+        <p:blipFill>
+          <a:blip r:embed="rId7" cstate="print">
+            <a:extLst>
+              <a:ext uri="{28A0092B-C50C-407E-A947-70E740481C1C}">
+                <a14:useLocalDpi xmlns:a14="http://schemas.microsoft.com/office/drawing/2010/main" val="0"/>
+              </a:ext>
+            </a:extLst>
+          </a:blip>
+          <a:stretch>
+            <a:fillRect/>
+          </a:stretch>
+        </p:blipFill>
+        <p:spPr>
+          <a:xfrm>
+            <a:off x="2549159" y="2187505"/>
+            <a:ext cx="1315896" cy="1315896"/>
           </a:xfrm>
           <a:prstGeom prst="rect">
             <a:avLst/>
@@ -6914,7 +6379,7 @@
     </p:spTree>
     <p:extLst>
       <p:ext uri="{BB962C8B-B14F-4D97-AF65-F5344CB8AC3E}">
-        <p14:creationId xmlns:p14="http://schemas.microsoft.com/office/powerpoint/2010/main" val="1990497307"/>
+        <p14:creationId xmlns:p14="http://schemas.microsoft.com/office/powerpoint/2010/main" val="120894764"/>
       </p:ext>
     </p:extLst>
   </p:cSld>
@@ -7231,980 +6696,6 @@
           </a:p>
         </p:txBody>
       </p:sp>
-      <p:pic>
-        <p:nvPicPr>
-          <p:cNvPr id="4" name="Imagem 3"/>
-          <p:cNvPicPr>
-            <a:picLocks noChangeAspect="1"/>
-          </p:cNvPicPr>
-          <p:nvPr/>
-        </p:nvPicPr>
-        <p:blipFill>
-          <a:blip r:embed="rId4" cstate="print">
-            <a:extLst>
-              <a:ext uri="{28A0092B-C50C-407E-A947-70E740481C1C}">
-                <a14:useLocalDpi xmlns:a14="http://schemas.microsoft.com/office/drawing/2010/main" val="0"/>
-              </a:ext>
-            </a:extLst>
-          </a:blip>
-          <a:stretch>
-            <a:fillRect/>
-          </a:stretch>
-        </p:blipFill>
-        <p:spPr>
-          <a:xfrm>
-            <a:off x="2627008" y="1991760"/>
-            <a:ext cx="888174" cy="889654"/>
-          </a:xfrm>
-          <a:prstGeom prst="rect">
-            <a:avLst/>
-          </a:prstGeom>
-        </p:spPr>
-      </p:pic>
-      <p:pic>
-        <p:nvPicPr>
-          <p:cNvPr id="10" name="Imagem 9"/>
-          <p:cNvPicPr>
-            <a:picLocks noChangeAspect="1"/>
-          </p:cNvPicPr>
-          <p:nvPr/>
-        </p:nvPicPr>
-        <p:blipFill>
-          <a:blip r:embed="rId4" cstate="print">
-            <a:extLst>
-              <a:ext uri="{28A0092B-C50C-407E-A947-70E740481C1C}">
-                <a14:useLocalDpi xmlns:a14="http://schemas.microsoft.com/office/drawing/2010/main" val="0"/>
-              </a:ext>
-            </a:extLst>
-          </a:blip>
-          <a:stretch>
-            <a:fillRect/>
-          </a:stretch>
-        </p:blipFill>
-        <p:spPr>
-          <a:xfrm>
-            <a:off x="4455340" y="1991760"/>
-            <a:ext cx="888174" cy="889654"/>
-          </a:xfrm>
-          <a:prstGeom prst="rect">
-            <a:avLst/>
-          </a:prstGeom>
-        </p:spPr>
-      </p:pic>
-      <p:pic>
-        <p:nvPicPr>
-          <p:cNvPr id="11" name="Imagem 10"/>
-          <p:cNvPicPr>
-            <a:picLocks noChangeAspect="1"/>
-          </p:cNvPicPr>
-          <p:nvPr/>
-        </p:nvPicPr>
-        <p:blipFill>
-          <a:blip r:embed="rId4" cstate="print">
-            <a:extLst>
-              <a:ext uri="{28A0092B-C50C-407E-A947-70E740481C1C}">
-                <a14:useLocalDpi xmlns:a14="http://schemas.microsoft.com/office/drawing/2010/main" val="0"/>
-              </a:ext>
-            </a:extLst>
-          </a:blip>
-          <a:stretch>
-            <a:fillRect/>
-          </a:stretch>
-        </p:blipFill>
-        <p:spPr>
-          <a:xfrm>
-            <a:off x="2736801" y="3818414"/>
-            <a:ext cx="888174" cy="889654"/>
-          </a:xfrm>
-          <a:prstGeom prst="rect">
-            <a:avLst/>
-          </a:prstGeom>
-        </p:spPr>
-      </p:pic>
-      <p:pic>
-        <p:nvPicPr>
-          <p:cNvPr id="12" name="Imagem 11"/>
-          <p:cNvPicPr>
-            <a:picLocks noChangeAspect="1"/>
-          </p:cNvPicPr>
-          <p:nvPr/>
-        </p:nvPicPr>
-        <p:blipFill>
-          <a:blip r:embed="rId4" cstate="print">
-            <a:extLst>
-              <a:ext uri="{28A0092B-C50C-407E-A947-70E740481C1C}">
-                <a14:useLocalDpi xmlns:a14="http://schemas.microsoft.com/office/drawing/2010/main" val="0"/>
-              </a:ext>
-            </a:extLst>
-          </a:blip>
-          <a:stretch>
-            <a:fillRect/>
-          </a:stretch>
-        </p:blipFill>
-        <p:spPr>
-          <a:xfrm>
-            <a:off x="7962617" y="1992845"/>
-            <a:ext cx="888174" cy="889654"/>
-          </a:xfrm>
-          <a:prstGeom prst="rect">
-            <a:avLst/>
-          </a:prstGeom>
-        </p:spPr>
-      </p:pic>
-      <p:pic>
-        <p:nvPicPr>
-          <p:cNvPr id="5" name="Imagem 4"/>
-          <p:cNvPicPr>
-            <a:picLocks noChangeAspect="1"/>
-          </p:cNvPicPr>
-          <p:nvPr/>
-        </p:nvPicPr>
-        <p:blipFill>
-          <a:blip r:embed="rId5" cstate="print">
-            <a:extLst>
-              <a:ext uri="{28A0092B-C50C-407E-A947-70E740481C1C}">
-                <a14:useLocalDpi xmlns:a14="http://schemas.microsoft.com/office/drawing/2010/main" val="0"/>
-              </a:ext>
-            </a:extLst>
-          </a:blip>
-          <a:stretch>
-            <a:fillRect/>
-          </a:stretch>
-        </p:blipFill>
-        <p:spPr>
-          <a:xfrm>
-            <a:off x="5952267" y="1876367"/>
-            <a:ext cx="1070192" cy="1070192"/>
-          </a:xfrm>
-          <a:prstGeom prst="rect">
-            <a:avLst/>
-          </a:prstGeom>
-        </p:spPr>
-      </p:pic>
-      <p:pic>
-        <p:nvPicPr>
-          <p:cNvPr id="14" name="Imagem 13"/>
-          <p:cNvPicPr>
-            <a:picLocks noChangeAspect="1"/>
-          </p:cNvPicPr>
-          <p:nvPr/>
-        </p:nvPicPr>
-        <p:blipFill>
-          <a:blip r:embed="rId5" cstate="print">
-            <a:extLst>
-              <a:ext uri="{28A0092B-C50C-407E-A947-70E740481C1C}">
-                <a14:useLocalDpi xmlns:a14="http://schemas.microsoft.com/office/drawing/2010/main" val="0"/>
-              </a:ext>
-            </a:extLst>
-          </a:blip>
-          <a:stretch>
-            <a:fillRect/>
-          </a:stretch>
-        </p:blipFill>
-        <p:spPr>
-          <a:xfrm>
-            <a:off x="4384648" y="3728145"/>
-            <a:ext cx="1070192" cy="1070192"/>
-          </a:xfrm>
-          <a:prstGeom prst="rect">
-            <a:avLst/>
-          </a:prstGeom>
-        </p:spPr>
-      </p:pic>
-      <p:sp>
-        <p:nvSpPr>
-          <p:cNvPr id="15" name="Retângulo 14"/>
-          <p:cNvSpPr/>
-          <p:nvPr/>
-        </p:nvSpPr>
-        <p:spPr>
-          <a:xfrm>
-            <a:off x="2371150" y="2988184"/>
-            <a:ext cx="1425857" cy="646331"/>
-          </a:xfrm>
-          <a:prstGeom prst="rect">
-            <a:avLst/>
-          </a:prstGeom>
-          <a:noFill/>
-        </p:spPr>
-        <p:txBody>
-          <a:bodyPr wrap="square" lIns="91440" tIns="45720" rIns="91440" bIns="45720">
-            <a:spAutoFit/>
-          </a:bodyPr>
-          <a:lstStyle/>
-          <a:p>
-            <a:pPr algn="ctr"/>
-            <a:r>
-              <a:rPr lang="pt-PT" b="1" spc="50" dirty="0" smtClean="0">
-                <a:ln w="9525" cmpd="sng">
-                  <a:solidFill>
-                    <a:schemeClr val="accent1"/>
-                  </a:solidFill>
-                  <a:prstDash val="solid"/>
-                </a:ln>
-                <a:solidFill>
-                  <a:srgbClr val="70AD47">
-                    <a:tint val="1000"/>
-                  </a:srgbClr>
-                </a:solidFill>
-                <a:effectLst>
-                  <a:glow rad="38100">
-                    <a:schemeClr val="accent1">
-                      <a:alpha val="40000"/>
-                    </a:schemeClr>
-                  </a:glow>
-                </a:effectLst>
-              </a:rPr>
-              <a:t>Prof. Ângela Cruz</a:t>
-            </a:r>
-            <a:endParaRPr lang="pt-PT" b="1" cap="none" spc="50" dirty="0">
-              <a:ln w="9525" cmpd="sng">
-                <a:solidFill>
-                  <a:schemeClr val="accent1"/>
-                </a:solidFill>
-                <a:prstDash val="solid"/>
-              </a:ln>
-              <a:solidFill>
-                <a:srgbClr val="70AD47">
-                  <a:tint val="1000"/>
-                </a:srgbClr>
-              </a:solidFill>
-              <a:effectLst>
-                <a:glow rad="38100">
-                  <a:schemeClr val="accent1">
-                    <a:alpha val="40000"/>
-                  </a:schemeClr>
-                </a:glow>
-              </a:effectLst>
-            </a:endParaRPr>
-          </a:p>
-        </p:txBody>
-      </p:sp>
-      <p:sp>
-        <p:nvSpPr>
-          <p:cNvPr id="16" name="Retângulo 15"/>
-          <p:cNvSpPr/>
-          <p:nvPr/>
-        </p:nvSpPr>
-        <p:spPr>
-          <a:xfrm>
-            <a:off x="4066300" y="2946559"/>
-            <a:ext cx="1425857" cy="646331"/>
-          </a:xfrm>
-          <a:prstGeom prst="rect">
-            <a:avLst/>
-          </a:prstGeom>
-          <a:noFill/>
-        </p:spPr>
-        <p:txBody>
-          <a:bodyPr wrap="square" lIns="91440" tIns="45720" rIns="91440" bIns="45720">
-            <a:spAutoFit/>
-          </a:bodyPr>
-          <a:lstStyle/>
-          <a:p>
-            <a:pPr algn="ctr"/>
-            <a:r>
-              <a:rPr lang="pt-PT" b="1" spc="50" dirty="0" smtClean="0">
-                <a:ln w="9525" cmpd="sng">
-                  <a:solidFill>
-                    <a:schemeClr val="accent1"/>
-                  </a:solidFill>
-                  <a:prstDash val="solid"/>
-                </a:ln>
-                <a:solidFill>
-                  <a:srgbClr val="70AD47">
-                    <a:tint val="1000"/>
-                  </a:srgbClr>
-                </a:solidFill>
-                <a:effectLst>
-                  <a:glow rad="38100">
-                    <a:schemeClr val="accent1">
-                      <a:alpha val="40000"/>
-                    </a:schemeClr>
-                  </a:glow>
-                </a:effectLst>
-              </a:rPr>
-              <a:t>Prof. Liliana Santos</a:t>
-            </a:r>
-            <a:endParaRPr lang="pt-PT" b="1" cap="none" spc="50" dirty="0">
-              <a:ln w="9525" cmpd="sng">
-                <a:solidFill>
-                  <a:schemeClr val="accent1"/>
-                </a:solidFill>
-                <a:prstDash val="solid"/>
-              </a:ln>
-              <a:solidFill>
-                <a:srgbClr val="70AD47">
-                  <a:tint val="1000"/>
-                </a:srgbClr>
-              </a:solidFill>
-              <a:effectLst>
-                <a:glow rad="38100">
-                  <a:schemeClr val="accent1">
-                    <a:alpha val="40000"/>
-                  </a:schemeClr>
-                </a:glow>
-              </a:effectLst>
-            </a:endParaRPr>
-          </a:p>
-        </p:txBody>
-      </p:sp>
-      <p:sp>
-        <p:nvSpPr>
-          <p:cNvPr id="17" name="Retângulo 16"/>
-          <p:cNvSpPr/>
-          <p:nvPr/>
-        </p:nvSpPr>
-        <p:spPr>
-          <a:xfrm>
-            <a:off x="5774434" y="2991192"/>
-            <a:ext cx="1425857" cy="646331"/>
-          </a:xfrm>
-          <a:prstGeom prst="rect">
-            <a:avLst/>
-          </a:prstGeom>
-          <a:noFill/>
-        </p:spPr>
-        <p:txBody>
-          <a:bodyPr wrap="square" lIns="91440" tIns="45720" rIns="91440" bIns="45720">
-            <a:spAutoFit/>
-          </a:bodyPr>
-          <a:lstStyle/>
-          <a:p>
-            <a:pPr algn="ctr"/>
-            <a:r>
-              <a:rPr lang="pt-PT" b="1" spc="50" dirty="0" smtClean="0">
-                <a:ln w="9525" cmpd="sng">
-                  <a:solidFill>
-                    <a:schemeClr val="accent1"/>
-                  </a:solidFill>
-                  <a:prstDash val="solid"/>
-                </a:ln>
-                <a:solidFill>
-                  <a:srgbClr val="70AD47">
-                    <a:tint val="1000"/>
-                  </a:srgbClr>
-                </a:solidFill>
-                <a:effectLst>
-                  <a:glow rad="38100">
-                    <a:schemeClr val="accent1">
-                      <a:alpha val="40000"/>
-                    </a:schemeClr>
-                  </a:glow>
-                </a:effectLst>
-              </a:rPr>
-              <a:t>Prof. Márcio Figueiredo</a:t>
-            </a:r>
-            <a:endParaRPr lang="pt-PT" b="1" cap="none" spc="50" dirty="0">
-              <a:ln w="9525" cmpd="sng">
-                <a:solidFill>
-                  <a:schemeClr val="accent1"/>
-                </a:solidFill>
-                <a:prstDash val="solid"/>
-              </a:ln>
-              <a:solidFill>
-                <a:srgbClr val="70AD47">
-                  <a:tint val="1000"/>
-                </a:srgbClr>
-              </a:solidFill>
-              <a:effectLst>
-                <a:glow rad="38100">
-                  <a:schemeClr val="accent1">
-                    <a:alpha val="40000"/>
-                  </a:schemeClr>
-                </a:glow>
-              </a:effectLst>
-            </a:endParaRPr>
-          </a:p>
-        </p:txBody>
-      </p:sp>
-      <p:sp>
-        <p:nvSpPr>
-          <p:cNvPr id="18" name="Retângulo 17"/>
-          <p:cNvSpPr/>
-          <p:nvPr/>
-        </p:nvSpPr>
-        <p:spPr>
-          <a:xfrm>
-            <a:off x="7521262" y="2988183"/>
-            <a:ext cx="1656456" cy="646331"/>
-          </a:xfrm>
-          <a:prstGeom prst="rect">
-            <a:avLst/>
-          </a:prstGeom>
-          <a:noFill/>
-        </p:spPr>
-        <p:txBody>
-          <a:bodyPr wrap="square" lIns="91440" tIns="45720" rIns="91440" bIns="45720">
-            <a:spAutoFit/>
-          </a:bodyPr>
-          <a:lstStyle/>
-          <a:p>
-            <a:pPr algn="ctr"/>
-            <a:r>
-              <a:rPr lang="pt-PT" b="1" spc="50" dirty="0" smtClean="0">
-                <a:ln w="9525" cmpd="sng">
-                  <a:solidFill>
-                    <a:schemeClr val="accent1"/>
-                  </a:solidFill>
-                  <a:prstDash val="solid"/>
-                </a:ln>
-                <a:solidFill>
-                  <a:srgbClr val="70AD47">
-                    <a:tint val="1000"/>
-                  </a:srgbClr>
-                </a:solidFill>
-                <a:effectLst>
-                  <a:glow rad="38100">
-                    <a:schemeClr val="accent1">
-                      <a:alpha val="40000"/>
-                    </a:schemeClr>
-                  </a:glow>
-                </a:effectLst>
-              </a:rPr>
-              <a:t>Prof. Manuela Ferrão </a:t>
-            </a:r>
-            <a:endParaRPr lang="pt-PT" b="1" cap="none" spc="50" dirty="0">
-              <a:ln w="9525" cmpd="sng">
-                <a:solidFill>
-                  <a:schemeClr val="accent1"/>
-                </a:solidFill>
-                <a:prstDash val="solid"/>
-              </a:ln>
-              <a:solidFill>
-                <a:srgbClr val="70AD47">
-                  <a:tint val="1000"/>
-                </a:srgbClr>
-              </a:solidFill>
-              <a:effectLst>
-                <a:glow rad="38100">
-                  <a:schemeClr val="accent1">
-                    <a:alpha val="40000"/>
-                  </a:schemeClr>
-                </a:glow>
-              </a:effectLst>
-            </a:endParaRPr>
-          </a:p>
-        </p:txBody>
-      </p:sp>
-      <p:sp>
-        <p:nvSpPr>
-          <p:cNvPr id="19" name="Retângulo 18"/>
-          <p:cNvSpPr/>
-          <p:nvPr/>
-        </p:nvSpPr>
-        <p:spPr>
-          <a:xfrm>
-            <a:off x="2432432" y="4798337"/>
-            <a:ext cx="1425857" cy="646331"/>
-          </a:xfrm>
-          <a:prstGeom prst="rect">
-            <a:avLst/>
-          </a:prstGeom>
-          <a:noFill/>
-        </p:spPr>
-        <p:txBody>
-          <a:bodyPr wrap="square" lIns="91440" tIns="45720" rIns="91440" bIns="45720">
-            <a:spAutoFit/>
-          </a:bodyPr>
-          <a:lstStyle/>
-          <a:p>
-            <a:pPr algn="ctr"/>
-            <a:r>
-              <a:rPr lang="pt-PT" b="1" spc="50" dirty="0" smtClean="0">
-                <a:ln w="9525" cmpd="sng">
-                  <a:solidFill>
-                    <a:schemeClr val="accent1"/>
-                  </a:solidFill>
-                  <a:prstDash val="solid"/>
-                </a:ln>
-                <a:solidFill>
-                  <a:srgbClr val="70AD47">
-                    <a:tint val="1000"/>
-                  </a:srgbClr>
-                </a:solidFill>
-                <a:effectLst>
-                  <a:glow rad="38100">
-                    <a:schemeClr val="accent1">
-                      <a:alpha val="40000"/>
-                    </a:schemeClr>
-                  </a:glow>
-                </a:effectLst>
-              </a:rPr>
-              <a:t>Prof. Marisa Leitão</a:t>
-            </a:r>
-            <a:endParaRPr lang="pt-PT" b="1" cap="none" spc="50" dirty="0">
-              <a:ln w="9525" cmpd="sng">
-                <a:solidFill>
-                  <a:schemeClr val="accent1"/>
-                </a:solidFill>
-                <a:prstDash val="solid"/>
-              </a:ln>
-              <a:solidFill>
-                <a:srgbClr val="70AD47">
-                  <a:tint val="1000"/>
-                </a:srgbClr>
-              </a:solidFill>
-              <a:effectLst>
-                <a:glow rad="38100">
-                  <a:schemeClr val="accent1">
-                    <a:alpha val="40000"/>
-                  </a:schemeClr>
-                </a:glow>
-              </a:effectLst>
-            </a:endParaRPr>
-          </a:p>
-        </p:txBody>
-      </p:sp>
-      <p:sp>
-        <p:nvSpPr>
-          <p:cNvPr id="20" name="Retângulo 19"/>
-          <p:cNvSpPr/>
-          <p:nvPr/>
-        </p:nvSpPr>
-        <p:spPr>
-          <a:xfrm>
-            <a:off x="4186498" y="4836284"/>
-            <a:ext cx="1425857" cy="646331"/>
-          </a:xfrm>
-          <a:prstGeom prst="rect">
-            <a:avLst/>
-          </a:prstGeom>
-          <a:noFill/>
-        </p:spPr>
-        <p:txBody>
-          <a:bodyPr wrap="square" lIns="91440" tIns="45720" rIns="91440" bIns="45720">
-            <a:spAutoFit/>
-          </a:bodyPr>
-          <a:lstStyle/>
-          <a:p>
-            <a:pPr algn="ctr"/>
-            <a:r>
-              <a:rPr lang="pt-PT" b="1" spc="50" dirty="0" smtClean="0">
-                <a:ln w="9525" cmpd="sng">
-                  <a:solidFill>
-                    <a:schemeClr val="accent1"/>
-                  </a:solidFill>
-                  <a:prstDash val="solid"/>
-                </a:ln>
-                <a:solidFill>
-                  <a:srgbClr val="70AD47">
-                    <a:tint val="1000"/>
-                  </a:srgbClr>
-                </a:solidFill>
-                <a:effectLst>
-                  <a:glow rad="38100">
-                    <a:schemeClr val="accent1">
-                      <a:alpha val="40000"/>
-                    </a:schemeClr>
-                  </a:glow>
-                </a:effectLst>
-              </a:rPr>
-              <a:t>Prof. Luís Gomes</a:t>
-            </a:r>
-            <a:endParaRPr lang="pt-PT" b="1" cap="none" spc="50" dirty="0">
-              <a:ln w="9525" cmpd="sng">
-                <a:solidFill>
-                  <a:schemeClr val="accent1"/>
-                </a:solidFill>
-                <a:prstDash val="solid"/>
-              </a:ln>
-              <a:solidFill>
-                <a:srgbClr val="70AD47">
-                  <a:tint val="1000"/>
-                </a:srgbClr>
-              </a:solidFill>
-              <a:effectLst>
-                <a:glow rad="38100">
-                  <a:schemeClr val="accent1">
-                    <a:alpha val="40000"/>
-                  </a:schemeClr>
-                </a:glow>
-              </a:effectLst>
-            </a:endParaRPr>
-          </a:p>
-        </p:txBody>
-      </p:sp>
-      <p:pic>
-        <p:nvPicPr>
-          <p:cNvPr id="21" name="Imagem 20"/>
-          <p:cNvPicPr>
-            <a:picLocks noChangeAspect="1"/>
-          </p:cNvPicPr>
-          <p:nvPr/>
-        </p:nvPicPr>
-        <p:blipFill>
-          <a:blip r:embed="rId6" cstate="print">
-            <a:extLst>
-              <a:ext uri="{28A0092B-C50C-407E-A947-70E740481C1C}">
-                <a14:useLocalDpi xmlns:a14="http://schemas.microsoft.com/office/drawing/2010/main" val="0"/>
-              </a:ext>
-            </a:extLst>
-          </a:blip>
-          <a:stretch>
-            <a:fillRect/>
-          </a:stretch>
-        </p:blipFill>
-        <p:spPr>
-          <a:xfrm>
-            <a:off x="9151960" y="5353943"/>
-            <a:ext cx="518823" cy="518823"/>
-          </a:xfrm>
-          <a:prstGeom prst="rect">
-            <a:avLst/>
-          </a:prstGeom>
-        </p:spPr>
-      </p:pic>
-      <p:pic>
-        <p:nvPicPr>
-          <p:cNvPr id="22" name="Imagem 21"/>
-          <p:cNvPicPr>
-            <a:picLocks noChangeAspect="1"/>
-          </p:cNvPicPr>
-          <p:nvPr/>
-        </p:nvPicPr>
-        <p:blipFill>
-          <a:blip r:embed="rId7" cstate="print">
-            <a:extLst>
-              <a:ext uri="{28A0092B-C50C-407E-A947-70E740481C1C}">
-                <a14:useLocalDpi xmlns:a14="http://schemas.microsoft.com/office/drawing/2010/main" val="0"/>
-              </a:ext>
-            </a:extLst>
-          </a:blip>
-          <a:stretch>
-            <a:fillRect/>
-          </a:stretch>
-        </p:blipFill>
-        <p:spPr>
-          <a:xfrm>
-            <a:off x="2549159" y="2187505"/>
-            <a:ext cx="1315896" cy="1315896"/>
-          </a:xfrm>
-          <a:prstGeom prst="rect">
-            <a:avLst/>
-          </a:prstGeom>
-        </p:spPr>
-      </p:pic>
-    </p:spTree>
-    <p:extLst>
-      <p:ext uri="{BB962C8B-B14F-4D97-AF65-F5344CB8AC3E}">
-        <p14:creationId xmlns:p14="http://schemas.microsoft.com/office/powerpoint/2010/main" val="120894764"/>
-      </p:ext>
-    </p:extLst>
-  </p:cSld>
-  <p:clrMapOvr>
-    <a:masterClrMapping/>
-  </p:clrMapOvr>
-  <p:timing>
-    <p:tnLst>
-      <p:par>
-        <p:cTn id="1" dur="indefinite" restart="never" nodeType="tmRoot">
-          <p:childTnLst>
-            <p:seq concurrent="1" nextAc="seek">
-              <p:cTn id="2" dur="indefinite" nodeType="mainSeq">
-                <p:childTnLst>
-                  <p:par>
-                    <p:cTn id="3" fill="hold">
-                      <p:stCondLst>
-                        <p:cond delay="indefinite"/>
-                      </p:stCondLst>
-                      <p:childTnLst>
-                        <p:par>
-                          <p:cTn id="4" fill="hold">
-                            <p:stCondLst>
-                              <p:cond delay="0"/>
-                            </p:stCondLst>
-                            <p:childTnLst>
-                              <p:par>
-                                <p:cTn id="5" presetID="1" presetClass="entr" presetSubtype="0" fill="hold" nodeType="clickEffect">
-                                  <p:stCondLst>
-                                    <p:cond delay="0"/>
-                                  </p:stCondLst>
-                                  <p:childTnLst>
-                                    <p:set>
-                                      <p:cBhvr>
-                                        <p:cTn id="6" dur="1" fill="hold">
-                                          <p:stCondLst>
-                                            <p:cond delay="0"/>
-                                          </p:stCondLst>
-                                        </p:cTn>
-                                        <p:tgtEl>
-                                          <p:spTgt spid="22"/>
-                                        </p:tgtEl>
-                                        <p:attrNameLst>
-                                          <p:attrName>style.visibility</p:attrName>
-                                        </p:attrNameLst>
-                                      </p:cBhvr>
-                                      <p:to>
-                                        <p:strVal val="visible"/>
-                                      </p:to>
-                                    </p:set>
-                                  </p:childTnLst>
-                                </p:cTn>
-                              </p:par>
-                            </p:childTnLst>
-                          </p:cTn>
-                        </p:par>
-                      </p:childTnLst>
-                    </p:cTn>
-                  </p:par>
-                </p:childTnLst>
-              </p:cTn>
-              <p:prevCondLst>
-                <p:cond evt="onPrev" delay="0">
-                  <p:tgtEl>
-                    <p:sldTgt/>
-                  </p:tgtEl>
-                </p:cond>
-              </p:prevCondLst>
-              <p:nextCondLst>
-                <p:cond evt="onNext" delay="0">
-                  <p:tgtEl>
-                    <p:sldTgt/>
-                  </p:tgtEl>
-                </p:cond>
-              </p:nextCondLst>
-            </p:seq>
-          </p:childTnLst>
-        </p:cTn>
-      </p:par>
-    </p:tnLst>
-  </p:timing>
-</p:sld>
-</file>
-
-<file path=ppt/slides/slide5.xml><?xml version="1.0" encoding="utf-8"?>
-<p:sld xmlns:a="http://schemas.openxmlformats.org/drawingml/2006/main" xmlns:r="http://schemas.openxmlformats.org/officeDocument/2006/relationships" xmlns:p="http://schemas.openxmlformats.org/presentationml/2006/main">
-  <p:cSld>
-    <p:spTree>
-      <p:nvGrpSpPr>
-        <p:cNvPr id="1" name=""/>
-        <p:cNvGrpSpPr/>
-        <p:nvPr/>
-      </p:nvGrpSpPr>
-      <p:grpSpPr>
-        <a:xfrm>
-          <a:off x="0" y="0"/>
-          <a:ext cx="0" cy="0"/>
-          <a:chOff x="0" y="0"/>
-          <a:chExt cx="0" cy="0"/>
-        </a:xfrm>
-      </p:grpSpPr>
-      <p:pic>
-        <p:nvPicPr>
-          <p:cNvPr id="2" name="Imagem 1"/>
-          <p:cNvPicPr>
-            <a:picLocks noChangeAspect="1"/>
-          </p:cNvPicPr>
-          <p:nvPr/>
-        </p:nvPicPr>
-        <p:blipFill>
-          <a:blip r:embed="rId2">
-            <a:extLst>
-              <a:ext uri="{28A0092B-C50C-407E-A947-70E740481C1C}">
-                <a14:useLocalDpi xmlns:a14="http://schemas.microsoft.com/office/drawing/2010/main" val="0"/>
-              </a:ext>
-            </a:extLst>
-          </a:blip>
-          <a:stretch>
-            <a:fillRect/>
-          </a:stretch>
-        </p:blipFill>
-        <p:spPr>
-          <a:xfrm>
-            <a:off x="965915" y="268759"/>
-            <a:ext cx="9697791" cy="6469285"/>
-          </a:xfrm>
-          <a:prstGeom prst="rect">
-            <a:avLst/>
-          </a:prstGeom>
-        </p:spPr>
-      </p:pic>
-      <p:sp>
-        <p:nvSpPr>
-          <p:cNvPr id="3" name="Retângulo 2"/>
-          <p:cNvSpPr/>
-          <p:nvPr/>
-        </p:nvSpPr>
-        <p:spPr>
-          <a:xfrm>
-            <a:off x="1906073" y="953037"/>
-            <a:ext cx="7856113" cy="4919729"/>
-          </a:xfrm>
-          <a:prstGeom prst="rect">
-            <a:avLst/>
-          </a:prstGeom>
-        </p:spPr>
-        <p:style>
-          <a:lnRef idx="2">
-            <a:schemeClr val="accent1">
-              <a:shade val="50000"/>
-            </a:schemeClr>
-          </a:lnRef>
-          <a:fillRef idx="1">
-            <a:schemeClr val="accent1"/>
-          </a:fillRef>
-          <a:effectRef idx="0">
-            <a:schemeClr val="accent1"/>
-          </a:effectRef>
-          <a:fontRef idx="minor">
-            <a:schemeClr val="lt1"/>
-          </a:fontRef>
-        </p:style>
-        <p:txBody>
-          <a:bodyPr rtlCol="0" anchor="ctr"/>
-          <a:lstStyle/>
-          <a:p>
-            <a:pPr algn="ctr"/>
-            <a:endParaRPr lang="pt-PT"/>
-          </a:p>
-        </p:txBody>
-      </p:sp>
-      <p:pic>
-        <p:nvPicPr>
-          <p:cNvPr id="8" name="Imagem 7"/>
-          <p:cNvPicPr>
-            <a:picLocks noChangeAspect="1"/>
-          </p:cNvPicPr>
-          <p:nvPr/>
-        </p:nvPicPr>
-        <p:blipFill>
-          <a:blip r:embed="rId3" cstate="print">
-            <a:extLst>
-              <a:ext uri="{28A0092B-C50C-407E-A947-70E740481C1C}">
-                <a14:useLocalDpi xmlns:a14="http://schemas.microsoft.com/office/drawing/2010/main" val="0"/>
-              </a:ext>
-            </a:extLst>
-          </a:blip>
-          <a:stretch>
-            <a:fillRect/>
-          </a:stretch>
-        </p:blipFill>
-        <p:spPr>
-          <a:xfrm>
-            <a:off x="2016782" y="1093005"/>
-            <a:ext cx="610226" cy="610226"/>
-          </a:xfrm>
-          <a:prstGeom prst="rect">
-            <a:avLst/>
-          </a:prstGeom>
-        </p:spPr>
-      </p:pic>
-      <p:sp>
-        <p:nvSpPr>
-          <p:cNvPr id="9" name="Retângulo 8"/>
-          <p:cNvSpPr/>
-          <p:nvPr/>
-        </p:nvSpPr>
-        <p:spPr>
-          <a:xfrm>
-            <a:off x="4827379" y="1876367"/>
-            <a:ext cx="184730" cy="923330"/>
-          </a:xfrm>
-          <a:prstGeom prst="rect">
-            <a:avLst/>
-          </a:prstGeom>
-          <a:noFill/>
-        </p:spPr>
-        <p:txBody>
-          <a:bodyPr wrap="none" lIns="91440" tIns="45720" rIns="91440" bIns="45720">
-            <a:spAutoFit/>
-          </a:bodyPr>
-          <a:lstStyle/>
-          <a:p>
-            <a:pPr algn="ctr"/>
-            <a:endParaRPr lang="pt-PT" sz="5400" b="1" spc="50" dirty="0" smtClean="0">
-              <a:ln w="9525" cmpd="sng">
-                <a:solidFill>
-                  <a:schemeClr val="accent1"/>
-                </a:solidFill>
-                <a:prstDash val="solid"/>
-              </a:ln>
-              <a:solidFill>
-                <a:srgbClr val="70AD47">
-                  <a:tint val="1000"/>
-                </a:srgbClr>
-              </a:solidFill>
-              <a:effectLst>
-                <a:glow rad="38100">
-                  <a:schemeClr val="accent1">
-                    <a:alpha val="40000"/>
-                  </a:schemeClr>
-                </a:glow>
-              </a:effectLst>
-            </a:endParaRPr>
-          </a:p>
-        </p:txBody>
-      </p:sp>
-      <p:sp>
-        <p:nvSpPr>
-          <p:cNvPr id="7" name="Retângulo 6"/>
-          <p:cNvSpPr/>
-          <p:nvPr/>
-        </p:nvSpPr>
-        <p:spPr>
-          <a:xfrm>
-            <a:off x="2698963" y="1241566"/>
-            <a:ext cx="4822299" cy="369332"/>
-          </a:xfrm>
-          <a:prstGeom prst="rect">
-            <a:avLst/>
-          </a:prstGeom>
-          <a:noFill/>
-        </p:spPr>
-        <p:txBody>
-          <a:bodyPr wrap="square" lIns="91440" tIns="45720" rIns="91440" bIns="45720">
-            <a:spAutoFit/>
-          </a:bodyPr>
-          <a:lstStyle/>
-          <a:p>
-            <a:pPr algn="ctr"/>
-            <a:r>
-              <a:rPr lang="pt-PT" b="1" cap="none" spc="50" dirty="0" smtClean="0">
-                <a:ln w="9525" cmpd="sng">
-                  <a:solidFill>
-                    <a:schemeClr val="accent1"/>
-                  </a:solidFill>
-                  <a:prstDash val="solid"/>
-                </a:ln>
-                <a:solidFill>
-                  <a:srgbClr val="70AD47">
-                    <a:tint val="1000"/>
-                  </a:srgbClr>
-                </a:solidFill>
-                <a:effectLst>
-                  <a:glow rad="38100">
-                    <a:schemeClr val="accent1">
-                      <a:alpha val="40000"/>
-                    </a:schemeClr>
-                  </a:glow>
-                </a:effectLst>
-              </a:rPr>
-              <a:t>Escola Básica e Secundária Artur Gonçalves</a:t>
-            </a:r>
-            <a:endParaRPr lang="pt-PT" b="1" cap="none" spc="50" dirty="0">
-              <a:ln w="9525" cmpd="sng">
-                <a:solidFill>
-                  <a:schemeClr val="accent1"/>
-                </a:solidFill>
-                <a:prstDash val="solid"/>
-              </a:ln>
-              <a:solidFill>
-                <a:srgbClr val="70AD47">
-                  <a:tint val="1000"/>
-                </a:srgbClr>
-              </a:solidFill>
-              <a:effectLst>
-                <a:glow rad="38100">
-                  <a:schemeClr val="accent1">
-                    <a:alpha val="40000"/>
-                  </a:schemeClr>
-                </a:glow>
-              </a:effectLst>
-            </a:endParaRPr>
-          </a:p>
-        </p:txBody>
-      </p:sp>
       <p:grpSp>
         <p:nvGrpSpPr>
           <p:cNvPr id="6" name="Grupo 5"/>
@@ -8739,7 +7230,7 @@
 </p:sld>
 </file>
 
-<file path=ppt/slides/slide6.xml><?xml version="1.0" encoding="utf-8"?>
+<file path=ppt/slides/slide5.xml><?xml version="1.0" encoding="utf-8"?>
 <p:sld xmlns:a="http://schemas.openxmlformats.org/drawingml/2006/main" xmlns:r="http://schemas.openxmlformats.org/officeDocument/2006/relationships" xmlns:p="http://schemas.openxmlformats.org/presentationml/2006/main">
   <p:cSld>
     <p:spTree>
@@ -10476,7 +8967,7 @@
 </p:sld>
 </file>
 
-<file path=ppt/slides/slide7.xml><?xml version="1.0" encoding="utf-8"?>
+<file path=ppt/slides/slide6.xml><?xml version="1.0" encoding="utf-8"?>
 <p:sld xmlns:a="http://schemas.openxmlformats.org/drawingml/2006/main" xmlns:r="http://schemas.openxmlformats.org/officeDocument/2006/relationships" xmlns:p="http://schemas.openxmlformats.org/presentationml/2006/main">
   <p:cSld>
     <p:spTree>
@@ -11489,7 +9980,7 @@
 </p:sld>
 </file>
 
-<file path=ppt/slides/slide8.xml><?xml version="1.0" encoding="utf-8"?>
+<file path=ppt/slides/slide7.xml><?xml version="1.0" encoding="utf-8"?>
 <p:sld xmlns:a="http://schemas.openxmlformats.org/drawingml/2006/main" xmlns:r="http://schemas.openxmlformats.org/officeDocument/2006/relationships" xmlns:p="http://schemas.openxmlformats.org/presentationml/2006/main">
   <p:cSld>
     <p:spTree>
@@ -12479,7 +10970,7 @@
 </p:sld>
 </file>
 
-<file path=ppt/slides/slide9.xml><?xml version="1.0" encoding="utf-8"?>
+<file path=ppt/slides/slide8.xml><?xml version="1.0" encoding="utf-8"?>
 <p:sld xmlns:a="http://schemas.openxmlformats.org/drawingml/2006/main" xmlns:r="http://schemas.openxmlformats.org/officeDocument/2006/relationships" xmlns:p="http://schemas.openxmlformats.org/presentationml/2006/main">
   <p:cSld>
     <p:spTree>
@@ -13875,6 +12366,986 @@
                                         </p:cTn>
                                         <p:tgtEl>
                                           <p:spTgt spid="48"/>
+                                        </p:tgtEl>
+                                        <p:attrNameLst>
+                                          <p:attrName>style.visibility</p:attrName>
+                                        </p:attrNameLst>
+                                      </p:cBhvr>
+                                      <p:to>
+                                        <p:strVal val="visible"/>
+                                      </p:to>
+                                    </p:set>
+                                  </p:childTnLst>
+                                </p:cTn>
+                              </p:par>
+                            </p:childTnLst>
+                          </p:cTn>
+                        </p:par>
+                      </p:childTnLst>
+                    </p:cTn>
+                  </p:par>
+                </p:childTnLst>
+              </p:cTn>
+              <p:prevCondLst>
+                <p:cond evt="onPrev" delay="0">
+                  <p:tgtEl>
+                    <p:sldTgt/>
+                  </p:tgtEl>
+                </p:cond>
+              </p:prevCondLst>
+              <p:nextCondLst>
+                <p:cond evt="onNext" delay="0">
+                  <p:tgtEl>
+                    <p:sldTgt/>
+                  </p:tgtEl>
+                </p:cond>
+              </p:nextCondLst>
+            </p:seq>
+          </p:childTnLst>
+        </p:cTn>
+      </p:par>
+    </p:tnLst>
+  </p:timing>
+</p:sld>
+</file>
+
+<file path=ppt/slides/slide9.xml><?xml version="1.0" encoding="utf-8"?>
+<p:sld xmlns:a="http://schemas.openxmlformats.org/drawingml/2006/main" xmlns:r="http://schemas.openxmlformats.org/officeDocument/2006/relationships" xmlns:p="http://schemas.openxmlformats.org/presentationml/2006/main">
+  <p:cSld>
+    <p:spTree>
+      <p:nvGrpSpPr>
+        <p:cNvPr id="1" name=""/>
+        <p:cNvGrpSpPr/>
+        <p:nvPr/>
+      </p:nvGrpSpPr>
+      <p:grpSpPr>
+        <a:xfrm>
+          <a:off x="0" y="0"/>
+          <a:ext cx="0" cy="0"/>
+          <a:chOff x="0" y="0"/>
+          <a:chExt cx="0" cy="0"/>
+        </a:xfrm>
+      </p:grpSpPr>
+      <p:pic>
+        <p:nvPicPr>
+          <p:cNvPr id="2" name="Imagem 1"/>
+          <p:cNvPicPr>
+            <a:picLocks noChangeAspect="1"/>
+          </p:cNvPicPr>
+          <p:nvPr/>
+        </p:nvPicPr>
+        <p:blipFill>
+          <a:blip r:embed="rId2">
+            <a:extLst>
+              <a:ext uri="{28A0092B-C50C-407E-A947-70E740481C1C}">
+                <a14:useLocalDpi xmlns:a14="http://schemas.microsoft.com/office/drawing/2010/main" val="0"/>
+              </a:ext>
+            </a:extLst>
+          </a:blip>
+          <a:stretch>
+            <a:fillRect/>
+          </a:stretch>
+        </p:blipFill>
+        <p:spPr>
+          <a:xfrm>
+            <a:off x="965915" y="268759"/>
+            <a:ext cx="9697791" cy="6469285"/>
+          </a:xfrm>
+          <a:prstGeom prst="rect">
+            <a:avLst/>
+          </a:prstGeom>
+        </p:spPr>
+      </p:pic>
+      <p:sp>
+        <p:nvSpPr>
+          <p:cNvPr id="3" name="Retângulo 2"/>
+          <p:cNvSpPr/>
+          <p:nvPr/>
+        </p:nvSpPr>
+        <p:spPr>
+          <a:xfrm>
+            <a:off x="1910730" y="953036"/>
+            <a:ext cx="7856113" cy="4919729"/>
+          </a:xfrm>
+          <a:prstGeom prst="rect">
+            <a:avLst/>
+          </a:prstGeom>
+        </p:spPr>
+        <p:style>
+          <a:lnRef idx="2">
+            <a:schemeClr val="accent1">
+              <a:shade val="50000"/>
+            </a:schemeClr>
+          </a:lnRef>
+          <a:fillRef idx="1">
+            <a:schemeClr val="accent1"/>
+          </a:fillRef>
+          <a:effectRef idx="0">
+            <a:schemeClr val="accent1"/>
+          </a:effectRef>
+          <a:fontRef idx="minor">
+            <a:schemeClr val="lt1"/>
+          </a:fontRef>
+        </p:style>
+        <p:txBody>
+          <a:bodyPr rtlCol="0" anchor="ctr"/>
+          <a:lstStyle/>
+          <a:p>
+            <a:pPr algn="ctr"/>
+            <a:endParaRPr lang="pt-PT"/>
+          </a:p>
+        </p:txBody>
+      </p:sp>
+      <p:pic>
+        <p:nvPicPr>
+          <p:cNvPr id="8" name="Imagem 7"/>
+          <p:cNvPicPr>
+            <a:picLocks noChangeAspect="1"/>
+          </p:cNvPicPr>
+          <p:nvPr/>
+        </p:nvPicPr>
+        <p:blipFill>
+          <a:blip r:embed="rId3" cstate="print">
+            <a:extLst>
+              <a:ext uri="{28A0092B-C50C-407E-A947-70E740481C1C}">
+                <a14:useLocalDpi xmlns:a14="http://schemas.microsoft.com/office/drawing/2010/main" val="0"/>
+              </a:ext>
+            </a:extLst>
+          </a:blip>
+          <a:stretch>
+            <a:fillRect/>
+          </a:stretch>
+        </p:blipFill>
+        <p:spPr>
+          <a:xfrm>
+            <a:off x="2016782" y="1093005"/>
+            <a:ext cx="610226" cy="610226"/>
+          </a:xfrm>
+          <a:prstGeom prst="rect">
+            <a:avLst/>
+          </a:prstGeom>
+        </p:spPr>
+      </p:pic>
+      <p:sp>
+        <p:nvSpPr>
+          <p:cNvPr id="9" name="Retângulo 8"/>
+          <p:cNvSpPr/>
+          <p:nvPr/>
+        </p:nvSpPr>
+        <p:spPr>
+          <a:xfrm>
+            <a:off x="4827379" y="1876367"/>
+            <a:ext cx="184730" cy="923330"/>
+          </a:xfrm>
+          <a:prstGeom prst="rect">
+            <a:avLst/>
+          </a:prstGeom>
+          <a:noFill/>
+        </p:spPr>
+        <p:txBody>
+          <a:bodyPr wrap="none" lIns="91440" tIns="45720" rIns="91440" bIns="45720">
+            <a:spAutoFit/>
+          </a:bodyPr>
+          <a:lstStyle/>
+          <a:p>
+            <a:pPr algn="ctr"/>
+            <a:endParaRPr lang="pt-PT" sz="5400" b="1" spc="50" dirty="0" smtClean="0">
+              <a:ln w="9525" cmpd="sng">
+                <a:solidFill>
+                  <a:schemeClr val="accent1"/>
+                </a:solidFill>
+                <a:prstDash val="solid"/>
+              </a:ln>
+              <a:solidFill>
+                <a:srgbClr val="70AD47">
+                  <a:tint val="1000"/>
+                </a:srgbClr>
+              </a:solidFill>
+              <a:effectLst>
+                <a:glow rad="38100">
+                  <a:schemeClr val="accent1">
+                    <a:alpha val="40000"/>
+                  </a:schemeClr>
+                </a:glow>
+              </a:effectLst>
+            </a:endParaRPr>
+          </a:p>
+        </p:txBody>
+      </p:sp>
+      <p:sp>
+        <p:nvSpPr>
+          <p:cNvPr id="7" name="Retângulo 6"/>
+          <p:cNvSpPr/>
+          <p:nvPr/>
+        </p:nvSpPr>
+        <p:spPr>
+          <a:xfrm>
+            <a:off x="2698963" y="1241566"/>
+            <a:ext cx="4822299" cy="369332"/>
+          </a:xfrm>
+          <a:prstGeom prst="rect">
+            <a:avLst/>
+          </a:prstGeom>
+          <a:noFill/>
+        </p:spPr>
+        <p:txBody>
+          <a:bodyPr wrap="square" lIns="91440" tIns="45720" rIns="91440" bIns="45720">
+            <a:spAutoFit/>
+          </a:bodyPr>
+          <a:lstStyle/>
+          <a:p>
+            <a:pPr algn="ctr"/>
+            <a:r>
+              <a:rPr lang="pt-PT" b="1" cap="none" spc="50" dirty="0" smtClean="0">
+                <a:ln w="9525" cmpd="sng">
+                  <a:solidFill>
+                    <a:schemeClr val="accent1"/>
+                  </a:solidFill>
+                  <a:prstDash val="solid"/>
+                </a:ln>
+                <a:solidFill>
+                  <a:srgbClr val="70AD47">
+                    <a:tint val="1000"/>
+                  </a:srgbClr>
+                </a:solidFill>
+                <a:effectLst>
+                  <a:glow rad="38100">
+                    <a:schemeClr val="accent1">
+                      <a:alpha val="40000"/>
+                    </a:schemeClr>
+                  </a:glow>
+                </a:effectLst>
+              </a:rPr>
+              <a:t>Escola Básica e Secundária Artur Gonçalves</a:t>
+            </a:r>
+            <a:endParaRPr lang="pt-PT" b="1" cap="none" spc="50" dirty="0">
+              <a:ln w="9525" cmpd="sng">
+                <a:solidFill>
+                  <a:schemeClr val="accent1"/>
+                </a:solidFill>
+                <a:prstDash val="solid"/>
+              </a:ln>
+              <a:solidFill>
+                <a:srgbClr val="70AD47">
+                  <a:tint val="1000"/>
+                </a:srgbClr>
+              </a:solidFill>
+              <a:effectLst>
+                <a:glow rad="38100">
+                  <a:schemeClr val="accent1">
+                    <a:alpha val="40000"/>
+                  </a:schemeClr>
+                </a:glow>
+              </a:effectLst>
+            </a:endParaRPr>
+          </a:p>
+        </p:txBody>
+      </p:sp>
+      <p:pic>
+        <p:nvPicPr>
+          <p:cNvPr id="21" name="Imagem 20"/>
+          <p:cNvPicPr>
+            <a:picLocks noChangeAspect="1"/>
+          </p:cNvPicPr>
+          <p:nvPr/>
+        </p:nvPicPr>
+        <p:blipFill>
+          <a:blip r:embed="rId4" cstate="print">
+            <a:extLst>
+              <a:ext uri="{28A0092B-C50C-407E-A947-70E740481C1C}">
+                <a14:useLocalDpi xmlns:a14="http://schemas.microsoft.com/office/drawing/2010/main" val="0"/>
+              </a:ext>
+            </a:extLst>
+          </a:blip>
+          <a:stretch>
+            <a:fillRect/>
+          </a:stretch>
+        </p:blipFill>
+        <p:spPr>
+          <a:xfrm>
+            <a:off x="8791310" y="4992092"/>
+            <a:ext cx="733260" cy="733260"/>
+          </a:xfrm>
+          <a:prstGeom prst="rect">
+            <a:avLst/>
+          </a:prstGeom>
+        </p:spPr>
+      </p:pic>
+      <p:sp>
+        <p:nvSpPr>
+          <p:cNvPr id="28" name="Retângulo 27"/>
+          <p:cNvSpPr/>
+          <p:nvPr/>
+        </p:nvSpPr>
+        <p:spPr>
+          <a:xfrm>
+            <a:off x="1524337" y="1683526"/>
+            <a:ext cx="3586176" cy="369332"/>
+          </a:xfrm>
+          <a:prstGeom prst="rect">
+            <a:avLst/>
+          </a:prstGeom>
+          <a:noFill/>
+        </p:spPr>
+        <p:txBody>
+          <a:bodyPr wrap="square" lIns="91440" tIns="45720" rIns="91440" bIns="45720">
+            <a:spAutoFit/>
+          </a:bodyPr>
+          <a:lstStyle/>
+          <a:p>
+            <a:pPr algn="ctr"/>
+            <a:r>
+              <a:rPr lang="pt-PT" b="1" cap="none" spc="50" dirty="0" smtClean="0">
+                <a:ln w="9525" cmpd="sng">
+                  <a:solidFill>
+                    <a:schemeClr val="accent1"/>
+                  </a:solidFill>
+                  <a:prstDash val="solid"/>
+                </a:ln>
+                <a:solidFill>
+                  <a:srgbClr val="70AD47">
+                    <a:tint val="1000"/>
+                  </a:srgbClr>
+                </a:solidFill>
+                <a:effectLst>
+                  <a:glow rad="38100">
+                    <a:schemeClr val="accent1">
+                      <a:alpha val="40000"/>
+                    </a:schemeClr>
+                  </a:glow>
+                </a:effectLst>
+              </a:rPr>
+              <a:t> </a:t>
+            </a:r>
+            <a:r>
+              <a:rPr lang="pt-PT" cap="none" spc="50" dirty="0" smtClean="0">
+                <a:ln w="9525" cmpd="sng">
+                  <a:solidFill>
+                    <a:schemeClr val="accent1"/>
+                  </a:solidFill>
+                  <a:prstDash val="solid"/>
+                </a:ln>
+                <a:solidFill>
+                  <a:srgbClr val="70AD47">
+                    <a:tint val="1000"/>
+                  </a:srgbClr>
+                </a:solidFill>
+                <a:effectLst>
+                  <a:glow rad="38100">
+                    <a:schemeClr val="accent1">
+                      <a:alpha val="40000"/>
+                    </a:schemeClr>
+                  </a:glow>
+                </a:effectLst>
+              </a:rPr>
+              <a:t>Aluno: </a:t>
+            </a:r>
+            <a:r>
+              <a:rPr lang="pt-PT" i="1" u="sng" cap="none" spc="50" dirty="0" smtClean="0">
+                <a:ln w="9525" cmpd="sng">
+                  <a:solidFill>
+                    <a:schemeClr val="accent1"/>
+                  </a:solidFill>
+                  <a:prstDash val="solid"/>
+                </a:ln>
+                <a:solidFill>
+                  <a:srgbClr val="70AD47">
+                    <a:tint val="1000"/>
+                  </a:srgbClr>
+                </a:solidFill>
+                <a:effectLst>
+                  <a:glow rad="38100">
+                    <a:schemeClr val="accent1">
+                      <a:alpha val="40000"/>
+                    </a:schemeClr>
+                  </a:glow>
+                </a:effectLst>
+              </a:rPr>
+              <a:t>1. Alberto Marques</a:t>
+            </a:r>
+            <a:endParaRPr lang="pt-PT" i="1" u="sng" cap="none" spc="50" dirty="0">
+              <a:ln w="9525" cmpd="sng">
+                <a:solidFill>
+                  <a:schemeClr val="accent1"/>
+                </a:solidFill>
+                <a:prstDash val="solid"/>
+              </a:ln>
+              <a:solidFill>
+                <a:srgbClr val="70AD47">
+                  <a:tint val="1000"/>
+                </a:srgbClr>
+              </a:solidFill>
+              <a:effectLst>
+                <a:glow rad="38100">
+                  <a:schemeClr val="accent1">
+                    <a:alpha val="40000"/>
+                  </a:schemeClr>
+                </a:glow>
+              </a:effectLst>
+            </a:endParaRPr>
+          </a:p>
+        </p:txBody>
+      </p:sp>
+      <p:pic>
+        <p:nvPicPr>
+          <p:cNvPr id="19" name="Imagem 18"/>
+          <p:cNvPicPr>
+            <a:picLocks noChangeAspect="1"/>
+          </p:cNvPicPr>
+          <p:nvPr/>
+        </p:nvPicPr>
+        <p:blipFill>
+          <a:blip r:embed="rId5" cstate="print">
+            <a:extLst>
+              <a:ext uri="{28A0092B-C50C-407E-A947-70E740481C1C}">
+                <a14:useLocalDpi xmlns:a14="http://schemas.microsoft.com/office/drawing/2010/main" val="0"/>
+              </a:ext>
+            </a:extLst>
+          </a:blip>
+          <a:stretch>
+            <a:fillRect/>
+          </a:stretch>
+        </p:blipFill>
+        <p:spPr>
+          <a:xfrm>
+            <a:off x="8157623" y="1096219"/>
+            <a:ext cx="419705" cy="419705"/>
+          </a:xfrm>
+          <a:prstGeom prst="rect">
+            <a:avLst/>
+          </a:prstGeom>
+        </p:spPr>
+      </p:pic>
+      <p:sp>
+        <p:nvSpPr>
+          <p:cNvPr id="20" name="Retângulo 19"/>
+          <p:cNvSpPr/>
+          <p:nvPr/>
+        </p:nvSpPr>
+        <p:spPr>
+          <a:xfrm>
+            <a:off x="1952387" y="2000926"/>
+            <a:ext cx="3980098" cy="369332"/>
+          </a:xfrm>
+          <a:prstGeom prst="rect">
+            <a:avLst/>
+          </a:prstGeom>
+          <a:noFill/>
+        </p:spPr>
+        <p:txBody>
+          <a:bodyPr wrap="square" lIns="91440" tIns="45720" rIns="91440" bIns="45720">
+            <a:spAutoFit/>
+          </a:bodyPr>
+          <a:lstStyle/>
+          <a:p>
+            <a:pPr algn="ctr"/>
+            <a:r>
+              <a:rPr lang="pt-PT" b="1" cap="none" spc="50" dirty="0" smtClean="0">
+                <a:ln w="9525" cmpd="sng">
+                  <a:solidFill>
+                    <a:schemeClr val="accent1"/>
+                  </a:solidFill>
+                  <a:prstDash val="solid"/>
+                </a:ln>
+                <a:solidFill>
+                  <a:srgbClr val="70AD47">
+                    <a:tint val="1000"/>
+                  </a:srgbClr>
+                </a:solidFill>
+                <a:effectLst>
+                  <a:glow rad="38100">
+                    <a:schemeClr val="accent1">
+                      <a:alpha val="40000"/>
+                    </a:schemeClr>
+                  </a:glow>
+                </a:effectLst>
+              </a:rPr>
+              <a:t> </a:t>
+            </a:r>
+            <a:r>
+              <a:rPr lang="pt-PT" b="1" spc="50" dirty="0" smtClean="0">
+                <a:ln w="9525" cmpd="sng">
+                  <a:solidFill>
+                    <a:schemeClr val="accent1"/>
+                  </a:solidFill>
+                  <a:prstDash val="solid"/>
+                </a:ln>
+                <a:solidFill>
+                  <a:srgbClr val="70AD47">
+                    <a:tint val="1000"/>
+                  </a:srgbClr>
+                </a:solidFill>
+                <a:effectLst>
+                  <a:glow rad="38100">
+                    <a:schemeClr val="accent1">
+                      <a:alpha val="40000"/>
+                    </a:schemeClr>
+                  </a:glow>
+                </a:effectLst>
+              </a:rPr>
+              <a:t>Teste 1: Onde está a felicidade?</a:t>
+            </a:r>
+            <a:endParaRPr lang="pt-PT" i="1" u="sng" cap="none" spc="50" dirty="0">
+              <a:ln w="9525" cmpd="sng">
+                <a:solidFill>
+                  <a:schemeClr val="accent1"/>
+                </a:solidFill>
+                <a:prstDash val="solid"/>
+              </a:ln>
+              <a:solidFill>
+                <a:srgbClr val="70AD47">
+                  <a:tint val="1000"/>
+                </a:srgbClr>
+              </a:solidFill>
+              <a:effectLst>
+                <a:glow rad="38100">
+                  <a:schemeClr val="accent1">
+                    <a:alpha val="40000"/>
+                  </a:schemeClr>
+                </a:glow>
+              </a:effectLst>
+            </a:endParaRPr>
+          </a:p>
+        </p:txBody>
+      </p:sp>
+      <p:sp>
+        <p:nvSpPr>
+          <p:cNvPr id="23" name="Retângulo 22"/>
+          <p:cNvSpPr/>
+          <p:nvPr/>
+        </p:nvSpPr>
+        <p:spPr>
+          <a:xfrm>
+            <a:off x="2321895" y="2332375"/>
+            <a:ext cx="6259133" cy="3349060"/>
+          </a:xfrm>
+          <a:prstGeom prst="rect">
+            <a:avLst/>
+          </a:prstGeom>
+          <a:solidFill>
+            <a:schemeClr val="accent1">
+              <a:lumMod val="60000"/>
+              <a:lumOff val="40000"/>
+            </a:schemeClr>
+          </a:solidFill>
+        </p:spPr>
+        <p:style>
+          <a:lnRef idx="2">
+            <a:schemeClr val="accent1">
+              <a:shade val="50000"/>
+            </a:schemeClr>
+          </a:lnRef>
+          <a:fillRef idx="1">
+            <a:schemeClr val="accent1"/>
+          </a:fillRef>
+          <a:effectRef idx="0">
+            <a:schemeClr val="accent1"/>
+          </a:effectRef>
+          <a:fontRef idx="minor">
+            <a:schemeClr val="lt1"/>
+          </a:fontRef>
+        </p:style>
+        <p:txBody>
+          <a:bodyPr rtlCol="0" anchor="ctr"/>
+          <a:lstStyle/>
+          <a:p>
+            <a:pPr algn="ctr"/>
+            <a:endParaRPr lang="pt-PT"/>
+          </a:p>
+        </p:txBody>
+      </p:sp>
+      <p:pic>
+        <p:nvPicPr>
+          <p:cNvPr id="29" name="Imagem 28"/>
+          <p:cNvPicPr>
+            <a:picLocks noChangeAspect="1"/>
+          </p:cNvPicPr>
+          <p:nvPr/>
+        </p:nvPicPr>
+        <p:blipFill>
+          <a:blip r:embed="rId6" cstate="print">
+            <a:extLst>
+              <a:ext uri="{28A0092B-C50C-407E-A947-70E740481C1C}">
+                <a14:useLocalDpi xmlns:a14="http://schemas.microsoft.com/office/drawing/2010/main" val="0"/>
+              </a:ext>
+            </a:extLst>
+          </a:blip>
+          <a:stretch>
+            <a:fillRect/>
+          </a:stretch>
+        </p:blipFill>
+        <p:spPr>
+          <a:xfrm>
+            <a:off x="8704254" y="4062014"/>
+            <a:ext cx="930078" cy="930078"/>
+          </a:xfrm>
+          <a:prstGeom prst="rect">
+            <a:avLst/>
+          </a:prstGeom>
+        </p:spPr>
+      </p:pic>
+      <p:sp>
+        <p:nvSpPr>
+          <p:cNvPr id="41" name="Retângulo 40"/>
+          <p:cNvSpPr/>
+          <p:nvPr/>
+        </p:nvSpPr>
+        <p:spPr>
+          <a:xfrm>
+            <a:off x="2294500" y="2370258"/>
+            <a:ext cx="6437424" cy="3416320"/>
+          </a:xfrm>
+          <a:prstGeom prst="rect">
+            <a:avLst/>
+          </a:prstGeom>
+          <a:noFill/>
+        </p:spPr>
+        <p:txBody>
+          <a:bodyPr wrap="square" lIns="91440" tIns="45720" rIns="91440" bIns="45720">
+            <a:spAutoFit/>
+          </a:bodyPr>
+          <a:lstStyle/>
+          <a:p>
+            <a:r>
+              <a:rPr lang="pt-PT" b="1" spc="50" dirty="0" smtClean="0">
+                <a:ln w="9525" cmpd="sng">
+                  <a:solidFill>
+                    <a:schemeClr val="accent1"/>
+                  </a:solidFill>
+                  <a:prstDash val="solid"/>
+                </a:ln>
+                <a:solidFill>
+                  <a:srgbClr val="70AD47">
+                    <a:tint val="1000"/>
+                  </a:srgbClr>
+                </a:solidFill>
+                <a:effectLst>
+                  <a:glow rad="38100">
+                    <a:schemeClr val="accent1">
+                      <a:alpha val="40000"/>
+                    </a:schemeClr>
+                  </a:glow>
+                </a:effectLst>
+              </a:rPr>
+              <a:t>	Onde está a felicidade? Ninguém sabe onde ela para ou onde se pode encontrar. Há quem diga que não está em nenhum lugar e que simplesmente acontece. E, no entanto, em algum sítio há de estar. Não lhes parece?</a:t>
+            </a:r>
+          </a:p>
+          <a:p>
+            <a:endParaRPr lang="pt-PT" b="1" spc="50" dirty="0">
+              <a:ln w="9525" cmpd="sng">
+                <a:solidFill>
+                  <a:schemeClr val="accent1"/>
+                </a:solidFill>
+                <a:prstDash val="solid"/>
+              </a:ln>
+              <a:solidFill>
+                <a:srgbClr val="70AD47">
+                  <a:tint val="1000"/>
+                </a:srgbClr>
+              </a:solidFill>
+              <a:effectLst>
+                <a:glow rad="38100">
+                  <a:schemeClr val="accent1">
+                    <a:alpha val="40000"/>
+                  </a:schemeClr>
+                </a:glow>
+              </a:effectLst>
+            </a:endParaRPr>
+          </a:p>
+          <a:p>
+            <a:r>
+              <a:rPr lang="pt-PT" b="1" spc="50" dirty="0" smtClean="0">
+                <a:ln w="9525" cmpd="sng">
+                  <a:solidFill>
+                    <a:schemeClr val="accent1"/>
+                  </a:solidFill>
+                  <a:prstDash val="solid"/>
+                </a:ln>
+                <a:solidFill>
+                  <a:srgbClr val="70AD47">
+                    <a:tint val="1000"/>
+                  </a:srgbClr>
+                </a:solidFill>
+                <a:effectLst>
+                  <a:glow rad="38100">
+                    <a:schemeClr val="accent1">
+                      <a:alpha val="40000"/>
+                    </a:schemeClr>
+                  </a:glow>
+                </a:effectLst>
+              </a:rPr>
+              <a:t>	Às vezes está tão perto, tão à vista, que nos passa despercebida e outras tão distante, tão escondida nesse tal lugar, que uma vida não chega para lá chegar.</a:t>
+            </a:r>
+          </a:p>
+          <a:p>
+            <a:endParaRPr lang="pt-PT" b="1" spc="50" dirty="0">
+              <a:ln w="9525" cmpd="sng">
+                <a:solidFill>
+                  <a:schemeClr val="accent1"/>
+                </a:solidFill>
+                <a:prstDash val="solid"/>
+              </a:ln>
+              <a:solidFill>
+                <a:srgbClr val="70AD47">
+                  <a:tint val="1000"/>
+                </a:srgbClr>
+              </a:solidFill>
+              <a:effectLst>
+                <a:glow rad="38100">
+                  <a:schemeClr val="accent1">
+                    <a:alpha val="40000"/>
+                  </a:schemeClr>
+                </a:glow>
+              </a:effectLst>
+            </a:endParaRPr>
+          </a:p>
+          <a:p>
+            <a:r>
+              <a:rPr lang="pt-PT" b="1" spc="50" dirty="0" smtClean="0">
+                <a:ln w="9525" cmpd="sng">
+                  <a:solidFill>
+                    <a:schemeClr val="accent1"/>
+                  </a:solidFill>
+                  <a:prstDash val="solid"/>
+                </a:ln>
+                <a:solidFill>
+                  <a:srgbClr val="70AD47">
+                    <a:tint val="1000"/>
+                  </a:srgbClr>
+                </a:solidFill>
+                <a:effectLst>
+                  <a:glow rad="38100">
+                    <a:schemeClr val="accent1">
+                      <a:alpha val="40000"/>
+                    </a:schemeClr>
+                  </a:glow>
+                </a:effectLst>
+              </a:rPr>
+              <a:t>	Há os que pensam que só a encontramos se não a procurarmos. Nem pensarmos nisso. E os que estão convencidos de que é preciso procura-la sem cessar. Por isso  </a:t>
+            </a:r>
+            <a:endParaRPr lang="pt-PT" i="1" u="sng" cap="none" spc="50" dirty="0">
+              <a:ln w="9525" cmpd="sng">
+                <a:solidFill>
+                  <a:schemeClr val="accent1"/>
+                </a:solidFill>
+                <a:prstDash val="solid"/>
+              </a:ln>
+              <a:solidFill>
+                <a:srgbClr val="70AD47">
+                  <a:tint val="1000"/>
+                </a:srgbClr>
+              </a:solidFill>
+              <a:effectLst>
+                <a:glow rad="38100">
+                  <a:schemeClr val="accent1">
+                    <a:alpha val="40000"/>
+                  </a:schemeClr>
+                </a:glow>
+              </a:effectLst>
+            </a:endParaRPr>
+          </a:p>
+        </p:txBody>
+      </p:sp>
+      <p:pic>
+        <p:nvPicPr>
+          <p:cNvPr id="42" name="Imagem 41"/>
+          <p:cNvPicPr>
+            <a:picLocks noChangeAspect="1"/>
+          </p:cNvPicPr>
+          <p:nvPr/>
+        </p:nvPicPr>
+        <p:blipFill>
+          <a:blip r:embed="rId7" cstate="print">
+            <a:extLst>
+              <a:ext uri="{28A0092B-C50C-407E-A947-70E740481C1C}">
+                <a14:useLocalDpi xmlns:a14="http://schemas.microsoft.com/office/drawing/2010/main" val="0"/>
+              </a:ext>
+            </a:extLst>
+          </a:blip>
+          <a:stretch>
+            <a:fillRect/>
+          </a:stretch>
+        </p:blipFill>
+        <p:spPr>
+          <a:xfrm rot="10800000">
+            <a:off x="8706524" y="3242891"/>
+            <a:ext cx="914676" cy="914676"/>
+          </a:xfrm>
+          <a:prstGeom prst="rect">
+            <a:avLst/>
+          </a:prstGeom>
+        </p:spPr>
+      </p:pic>
+      <p:pic>
+        <p:nvPicPr>
+          <p:cNvPr id="5" name="Imagem 4"/>
+          <p:cNvPicPr>
+            <a:picLocks noChangeAspect="1"/>
+          </p:cNvPicPr>
+          <p:nvPr/>
+        </p:nvPicPr>
+        <p:blipFill>
+          <a:blip r:embed="rId8"/>
+          <a:stretch>
+            <a:fillRect/>
+          </a:stretch>
+        </p:blipFill>
+        <p:spPr>
+          <a:xfrm>
+            <a:off x="8681548" y="1057001"/>
+            <a:ext cx="981075" cy="476250"/>
+          </a:xfrm>
+          <a:prstGeom prst="rect">
+            <a:avLst/>
+          </a:prstGeom>
+        </p:spPr>
+      </p:pic>
+      <p:pic>
+        <p:nvPicPr>
+          <p:cNvPr id="6" name="Imagem 5"/>
+          <p:cNvPicPr>
+            <a:picLocks noChangeAspect="1"/>
+          </p:cNvPicPr>
+          <p:nvPr/>
+        </p:nvPicPr>
+        <p:blipFill>
+          <a:blip r:embed="rId9" cstate="print">
+            <a:extLst>
+              <a:ext uri="{28A0092B-C50C-407E-A947-70E740481C1C}">
+                <a14:useLocalDpi xmlns:a14="http://schemas.microsoft.com/office/drawing/2010/main" val="0"/>
+              </a:ext>
+            </a:extLst>
+          </a:blip>
+          <a:stretch>
+            <a:fillRect/>
+          </a:stretch>
+        </p:blipFill>
+        <p:spPr>
+          <a:xfrm>
+            <a:off x="8753210" y="2456370"/>
+            <a:ext cx="788452" cy="788452"/>
+          </a:xfrm>
+          <a:prstGeom prst="rect">
+            <a:avLst/>
+          </a:prstGeom>
+        </p:spPr>
+      </p:pic>
+      <p:pic>
+        <p:nvPicPr>
+          <p:cNvPr id="1026" name="Picture 2" descr="http://www.iconki.com/icons/Web-development/128x128-webicons/rec.png"/>
+          <p:cNvPicPr>
+            <a:picLocks noChangeAspect="1" noChangeArrowheads="1"/>
+          </p:cNvPicPr>
+          <p:nvPr/>
+        </p:nvPicPr>
+        <p:blipFill>
+          <a:blip r:embed="rId10">
+            <a:extLst>
+              <a:ext uri="{28A0092B-C50C-407E-A947-70E740481C1C}">
+                <a14:useLocalDpi xmlns:a14="http://schemas.microsoft.com/office/drawing/2010/main" val="0"/>
+              </a:ext>
+            </a:extLst>
+          </a:blip>
+          <a:srcRect/>
+          <a:stretch>
+            <a:fillRect/>
+          </a:stretch>
+        </p:blipFill>
+        <p:spPr bwMode="auto">
+          <a:xfrm>
+            <a:off x="8720128" y="1606516"/>
+            <a:ext cx="819182" cy="819183"/>
+          </a:xfrm>
+          <a:prstGeom prst="rect">
+            <a:avLst/>
+          </a:prstGeom>
+          <a:noFill/>
+          <a:extLst>
+            <a:ext uri="{909E8E84-426E-40DD-AFC4-6F175D3DCCD1}">
+              <a14:hiddenFill xmlns:a14="http://schemas.microsoft.com/office/drawing/2010/main">
+                <a:solidFill>
+                  <a:srgbClr val="FFFFFF"/>
+                </a:solidFill>
+              </a14:hiddenFill>
+            </a:ext>
+          </a:extLst>
+        </p:spPr>
+      </p:pic>
+      <p:pic>
+        <p:nvPicPr>
+          <p:cNvPr id="43" name="Imagem 42"/>
+          <p:cNvPicPr>
+            <a:picLocks noChangeAspect="1"/>
+          </p:cNvPicPr>
+          <p:nvPr/>
+        </p:nvPicPr>
+        <p:blipFill>
+          <a:blip r:embed="rId11" cstate="print">
+            <a:extLst>
+              <a:ext uri="{28A0092B-C50C-407E-A947-70E740481C1C}">
+                <a14:useLocalDpi xmlns:a14="http://schemas.microsoft.com/office/drawing/2010/main" val="0"/>
+              </a:ext>
+            </a:extLst>
+          </a:blip>
+          <a:stretch>
+            <a:fillRect/>
+          </a:stretch>
+        </p:blipFill>
+        <p:spPr>
+          <a:xfrm>
+            <a:off x="8591436" y="1661884"/>
+            <a:ext cx="1315896" cy="1315896"/>
+          </a:xfrm>
+          <a:prstGeom prst="rect">
+            <a:avLst/>
+          </a:prstGeom>
+        </p:spPr>
+      </p:pic>
+    </p:spTree>
+    <p:extLst>
+      <p:ext uri="{BB962C8B-B14F-4D97-AF65-F5344CB8AC3E}">
+        <p14:creationId xmlns:p14="http://schemas.microsoft.com/office/powerpoint/2010/main" val="18114216"/>
+      </p:ext>
+    </p:extLst>
+  </p:cSld>
+  <p:clrMapOvr>
+    <a:masterClrMapping/>
+  </p:clrMapOvr>
+  <p:timing>
+    <p:tnLst>
+      <p:par>
+        <p:cTn id="1" dur="indefinite" restart="never" nodeType="tmRoot">
+          <p:childTnLst>
+            <p:seq concurrent="1" nextAc="seek">
+              <p:cTn id="2" dur="indefinite" nodeType="mainSeq">
+                <p:childTnLst>
+                  <p:par>
+                    <p:cTn id="3" fill="hold">
+                      <p:stCondLst>
+                        <p:cond delay="indefinite"/>
+                      </p:stCondLst>
+                      <p:childTnLst>
+                        <p:par>
+                          <p:cTn id="4" fill="hold">
+                            <p:stCondLst>
+                              <p:cond delay="0"/>
+                            </p:stCondLst>
+                            <p:childTnLst>
+                              <p:par>
+                                <p:cTn id="5" presetID="1" presetClass="entr" presetSubtype="0" fill="hold" nodeType="clickEffect">
+                                  <p:stCondLst>
+                                    <p:cond delay="0"/>
+                                  </p:stCondLst>
+                                  <p:childTnLst>
+                                    <p:set>
+                                      <p:cBhvr>
+                                        <p:cTn id="6" dur="1" fill="hold">
+                                          <p:stCondLst>
+                                            <p:cond delay="0"/>
+                                          </p:stCondLst>
+                                        </p:cTn>
+                                        <p:tgtEl>
+                                          <p:spTgt spid="43"/>
                                         </p:tgtEl>
                                         <p:attrNameLst>
                                           <p:attrName>style.visibility</p:attrName>

</xml_diff>